<commit_message>
week end update 2024-06-28
</commit_message>
<xml_diff>
--- a/Slides/PH223_Lecture_39.pptx
+++ b/Slides/PH223_Lecture_39.pptx
@@ -5,7 +5,7 @@
     <p:sldMasterId id="2147483648" r:id="rId1"/>
   </p:sldMasterIdLst>
   <p:notesMasterIdLst>
-    <p:notesMasterId r:id="rId39"/>
+    <p:notesMasterId r:id="rId40"/>
   </p:notesMasterIdLst>
   <p:sldIdLst>
     <p:sldId id="1169" r:id="rId2"/>
@@ -31,20 +31,21 @@
     <p:sldId id="262" r:id="rId22"/>
     <p:sldId id="1350" r:id="rId23"/>
     <p:sldId id="263" r:id="rId24"/>
-    <p:sldId id="270" r:id="rId25"/>
-    <p:sldId id="1349" r:id="rId26"/>
-    <p:sldId id="786" r:id="rId27"/>
-    <p:sldId id="787" r:id="rId28"/>
-    <p:sldId id="788" r:id="rId29"/>
-    <p:sldId id="789" r:id="rId30"/>
-    <p:sldId id="790" r:id="rId31"/>
-    <p:sldId id="791" r:id="rId32"/>
-    <p:sldId id="792" r:id="rId33"/>
-    <p:sldId id="793" r:id="rId34"/>
-    <p:sldId id="794" r:id="rId35"/>
-    <p:sldId id="795" r:id="rId36"/>
-    <p:sldId id="796" r:id="rId37"/>
-    <p:sldId id="797" r:id="rId38"/>
+    <p:sldId id="1352" r:id="rId25"/>
+    <p:sldId id="270" r:id="rId26"/>
+    <p:sldId id="1349" r:id="rId27"/>
+    <p:sldId id="786" r:id="rId28"/>
+    <p:sldId id="787" r:id="rId29"/>
+    <p:sldId id="788" r:id="rId30"/>
+    <p:sldId id="789" r:id="rId31"/>
+    <p:sldId id="790" r:id="rId32"/>
+    <p:sldId id="791" r:id="rId33"/>
+    <p:sldId id="792" r:id="rId34"/>
+    <p:sldId id="793" r:id="rId35"/>
+    <p:sldId id="794" r:id="rId36"/>
+    <p:sldId id="795" r:id="rId37"/>
+    <p:sldId id="796" r:id="rId38"/>
+    <p:sldId id="797" r:id="rId39"/>
   </p:sldIdLst>
   <p:sldSz cx="9144000" cy="6858000" type="screen4x3"/>
   <p:notesSz cx="6858000" cy="9144000"/>
@@ -160,14 +161,6 @@
     </p:ext>
   </p:extLst>
 </p:presentation>
-</file>
-
-<file path=ppt/revisionInfo.xml><?xml version="1.0" encoding="utf-8"?>
-<p1510:revInfo xmlns:a="http://schemas.openxmlformats.org/drawingml/2006/main" xmlns:r="http://schemas.openxmlformats.org/officeDocument/2006/relationships" xmlns:p1510="http://schemas.microsoft.com/office/powerpoint/2015/10/main">
-  <p1510:revLst>
-    <p1510:client id="{4D8B23B5-1BA9-4151-8439-284A398AFFC1}" v="9" dt="2023-11-14T18:11:17.966"/>
-  </p1510:revLst>
-</p1510:revInfo>
 </file>
 
 <file path=ppt/changesInfos/changesInfo1.xml><?xml version="1.0" encoding="utf-8"?>
@@ -968,6 +961,54 @@
       </pc:sldChg>
     </pc:docChg>
   </pc:docChgLst>
+  <pc:docChgLst>
+    <pc:chgData name="Lines, Todd" userId="afaf7c3a-e8aa-4568-882a-02ad8f9e19b0" providerId="ADAL" clId="{B3843D73-759D-4CC6-A757-4BA68ED4DB30}"/>
+    <pc:docChg chg="custSel addSld modSld">
+      <pc:chgData name="Lines, Todd" userId="afaf7c3a-e8aa-4568-882a-02ad8f9e19b0" providerId="ADAL" clId="{B3843D73-759D-4CC6-A757-4BA68ED4DB30}" dt="2024-06-28T17:52:55.325" v="5" actId="20577"/>
+      <pc:docMkLst>
+        <pc:docMk/>
+      </pc:docMkLst>
+      <pc:sldChg chg="addSp delSp modSp new mod modClrScheme chgLayout">
+        <pc:chgData name="Lines, Todd" userId="afaf7c3a-e8aa-4568-882a-02ad8f9e19b0" providerId="ADAL" clId="{B3843D73-759D-4CC6-A757-4BA68ED4DB30}" dt="2024-06-28T17:52:55.325" v="5" actId="20577"/>
+        <pc:sldMkLst>
+          <pc:docMk/>
+          <pc:sldMk cId="2246085489" sldId="1352"/>
+        </pc:sldMkLst>
+        <pc:spChg chg="del mod ord">
+          <ac:chgData name="Lines, Todd" userId="afaf7c3a-e8aa-4568-882a-02ad8f9e19b0" providerId="ADAL" clId="{B3843D73-759D-4CC6-A757-4BA68ED4DB30}" dt="2024-06-28T17:52:52.040" v="1" actId="700"/>
+          <ac:spMkLst>
+            <pc:docMk/>
+            <pc:sldMk cId="2246085489" sldId="1352"/>
+            <ac:spMk id="2" creationId="{6A49B761-94BE-C5C1-991C-99E643548A62}"/>
+          </ac:spMkLst>
+        </pc:spChg>
+        <pc:spChg chg="del mod ord">
+          <ac:chgData name="Lines, Todd" userId="afaf7c3a-e8aa-4568-882a-02ad8f9e19b0" providerId="ADAL" clId="{B3843D73-759D-4CC6-A757-4BA68ED4DB30}" dt="2024-06-28T17:52:52.040" v="1" actId="700"/>
+          <ac:spMkLst>
+            <pc:docMk/>
+            <pc:sldMk cId="2246085489" sldId="1352"/>
+            <ac:spMk id="3" creationId="{7E7FDFAE-5918-3A6E-2CBB-8CA262AA4193}"/>
+          </ac:spMkLst>
+        </pc:spChg>
+        <pc:spChg chg="add mod ord">
+          <ac:chgData name="Lines, Todd" userId="afaf7c3a-e8aa-4568-882a-02ad8f9e19b0" providerId="ADAL" clId="{B3843D73-759D-4CC6-A757-4BA68ED4DB30}" dt="2024-06-28T17:52:55.325" v="5" actId="20577"/>
+          <ac:spMkLst>
+            <pc:docMk/>
+            <pc:sldMk cId="2246085489" sldId="1352"/>
+            <ac:spMk id="4" creationId="{585903EF-7815-C248-B4A4-7E1C153C4AAB}"/>
+          </ac:spMkLst>
+        </pc:spChg>
+        <pc:spChg chg="add mod ord">
+          <ac:chgData name="Lines, Todd" userId="afaf7c3a-e8aa-4568-882a-02ad8f9e19b0" providerId="ADAL" clId="{B3843D73-759D-4CC6-A757-4BA68ED4DB30}" dt="2024-06-28T17:52:52.040" v="1" actId="700"/>
+          <ac:spMkLst>
+            <pc:docMk/>
+            <pc:sldMk cId="2246085489" sldId="1352"/>
+            <ac:spMk id="5" creationId="{71D27542-6604-39B5-4EBD-BC5CF5864566}"/>
+          </ac:spMkLst>
+        </pc:spChg>
+      </pc:sldChg>
+    </pc:docChg>
+  </pc:docChgLst>
 </pc:chgInfo>
 </file>
 
@@ -1053,7 +1094,7 @@
           <a:p>
             <a:fld id="{196A392B-9B90-4554-AA5F-9EF061AFF381}" type="datetimeFigureOut">
               <a:rPr lang="en-US" smtClean="0"/>
-              <a:t>11/14/2023</a:t>
+              <a:t>6/28/2024</a:t>
             </a:fld>
             <a:endParaRPr lang="en-US"/>
           </a:p>
@@ -1441,7 +1482,7 @@
             <a:fld id="{3265D87E-FA42-40DE-957A-0A6FB4C70793}" type="slidenum">
               <a:rPr lang="en-US"/>
               <a:pPr/>
-              <a:t>36</a:t>
+              <a:t>37</a:t>
             </a:fld>
             <a:endParaRPr lang="en-US"/>
           </a:p>
@@ -1525,7 +1566,7 @@
             <a:fld id="{87E63455-D3A3-418A-9B57-F123F2C5D257}" type="slidenum">
               <a:rPr lang="en-US"/>
               <a:pPr/>
-              <a:t>37</a:t>
+              <a:t>38</a:t>
             </a:fld>
             <a:endParaRPr lang="en-US"/>
           </a:p>
@@ -1609,7 +1650,7 @@
             <a:fld id="{7D84D3CF-9413-4021-8029-3F374568DF4F}" type="slidenum">
               <a:rPr lang="en-US"/>
               <a:pPr/>
-              <a:t>27</a:t>
+              <a:t>28</a:t>
             </a:fld>
             <a:endParaRPr lang="en-US"/>
           </a:p>
@@ -1693,7 +1734,7 @@
             <a:fld id="{14282D9E-4346-49B8-8705-37CC07BC61C2}" type="slidenum">
               <a:rPr lang="en-US"/>
               <a:pPr/>
-              <a:t>28</a:t>
+              <a:t>29</a:t>
             </a:fld>
             <a:endParaRPr lang="en-US"/>
           </a:p>
@@ -1777,7 +1818,7 @@
             <a:fld id="{1FC69A9F-3388-43C2-A2C7-4766DA2088F9}" type="slidenum">
               <a:rPr lang="en-US"/>
               <a:pPr/>
-              <a:t>29</a:t>
+              <a:t>30</a:t>
             </a:fld>
             <a:endParaRPr lang="en-US"/>
           </a:p>
@@ -1865,7 +1906,7 @@
             <a:fld id="{CEA29A13-AB96-4FB0-86BE-E65687A34777}" type="slidenum">
               <a:rPr lang="en-US"/>
               <a:pPr/>
-              <a:t>30</a:t>
+              <a:t>31</a:t>
             </a:fld>
             <a:endParaRPr lang="en-US"/>
           </a:p>
@@ -1953,7 +1994,7 @@
             <a:fld id="{EEBD27AE-821E-4F57-859D-257A4CD7A5FD}" type="slidenum">
               <a:rPr lang="en-US"/>
               <a:pPr/>
-              <a:t>32</a:t>
+              <a:t>33</a:t>
             </a:fld>
             <a:endParaRPr lang="en-US"/>
           </a:p>
@@ -2041,7 +2082,7 @@
             <a:fld id="{524EAF65-38B7-4975-BE2D-AAB363696CF2}" type="slidenum">
               <a:rPr lang="en-US"/>
               <a:pPr/>
-              <a:t>33</a:t>
+              <a:t>34</a:t>
             </a:fld>
             <a:endParaRPr lang="en-US"/>
           </a:p>
@@ -2129,7 +2170,7 @@
             <a:fld id="{FEFC722B-CBF8-4A0A-BDEE-ECCC475C4830}" type="slidenum">
               <a:rPr lang="en-US"/>
               <a:pPr/>
-              <a:t>34</a:t>
+              <a:t>35</a:t>
             </a:fld>
             <a:endParaRPr lang="en-US"/>
           </a:p>
@@ -2217,7 +2258,7 @@
             <a:fld id="{501A34B8-5F69-491E-B53A-8846CFF8EA1D}" type="slidenum">
               <a:rPr lang="en-US"/>
               <a:pPr/>
-              <a:t>35</a:t>
+              <a:t>36</a:t>
             </a:fld>
             <a:endParaRPr lang="en-US"/>
           </a:p>
@@ -2448,7 +2489,7 @@
             <a:fld id="{F6481F1E-66D2-4398-8A86-A9B055527FBD}" type="datetimeFigureOut">
               <a:rPr lang="en-US" smtClean="0"/>
               <a:pPr/>
-              <a:t>11/14/2023</a:t>
+              <a:t>6/28/2024</a:t>
             </a:fld>
             <a:endParaRPr lang="en-US"/>
           </a:p>
@@ -2613,7 +2654,7 @@
             <a:fld id="{F6481F1E-66D2-4398-8A86-A9B055527FBD}" type="datetimeFigureOut">
               <a:rPr lang="en-US" smtClean="0"/>
               <a:pPr/>
-              <a:t>11/14/2023</a:t>
+              <a:t>6/28/2024</a:t>
             </a:fld>
             <a:endParaRPr lang="en-US"/>
           </a:p>
@@ -2788,7 +2829,7 @@
             <a:fld id="{F6481F1E-66D2-4398-8A86-A9B055527FBD}" type="datetimeFigureOut">
               <a:rPr lang="en-US" smtClean="0"/>
               <a:pPr/>
-              <a:t>11/14/2023</a:t>
+              <a:t>6/28/2024</a:t>
             </a:fld>
             <a:endParaRPr lang="en-US"/>
           </a:p>
@@ -2953,7 +2994,7 @@
             <a:fld id="{F6481F1E-66D2-4398-8A86-A9B055527FBD}" type="datetimeFigureOut">
               <a:rPr lang="en-US" smtClean="0"/>
               <a:pPr/>
-              <a:t>11/14/2023</a:t>
+              <a:t>6/28/2024</a:t>
             </a:fld>
             <a:endParaRPr lang="en-US"/>
           </a:p>
@@ -3195,7 +3236,7 @@
             <a:fld id="{F6481F1E-66D2-4398-8A86-A9B055527FBD}" type="datetimeFigureOut">
               <a:rPr lang="en-US" smtClean="0"/>
               <a:pPr/>
-              <a:t>11/14/2023</a:t>
+              <a:t>6/28/2024</a:t>
             </a:fld>
             <a:endParaRPr lang="en-US"/>
           </a:p>
@@ -3477,7 +3518,7 @@
             <a:fld id="{F6481F1E-66D2-4398-8A86-A9B055527FBD}" type="datetimeFigureOut">
               <a:rPr lang="en-US" smtClean="0"/>
               <a:pPr/>
-              <a:t>11/14/2023</a:t>
+              <a:t>6/28/2024</a:t>
             </a:fld>
             <a:endParaRPr lang="en-US"/>
           </a:p>
@@ -3893,7 +3934,7 @@
             <a:fld id="{F6481F1E-66D2-4398-8A86-A9B055527FBD}" type="datetimeFigureOut">
               <a:rPr lang="en-US" smtClean="0"/>
               <a:pPr/>
-              <a:t>11/14/2023</a:t>
+              <a:t>6/28/2024</a:t>
             </a:fld>
             <a:endParaRPr lang="en-US"/>
           </a:p>
@@ -4007,7 +4048,7 @@
             <a:fld id="{F6481F1E-66D2-4398-8A86-A9B055527FBD}" type="datetimeFigureOut">
               <a:rPr lang="en-US" smtClean="0"/>
               <a:pPr/>
-              <a:t>11/14/2023</a:t>
+              <a:t>6/28/2024</a:t>
             </a:fld>
             <a:endParaRPr lang="en-US"/>
           </a:p>
@@ -4099,7 +4140,7 @@
             <a:fld id="{F6481F1E-66D2-4398-8A86-A9B055527FBD}" type="datetimeFigureOut">
               <a:rPr lang="en-US" smtClean="0"/>
               <a:pPr/>
-              <a:t>11/14/2023</a:t>
+              <a:t>6/28/2024</a:t>
             </a:fld>
             <a:endParaRPr lang="en-US"/>
           </a:p>
@@ -4371,7 +4412,7 @@
             <a:fld id="{F6481F1E-66D2-4398-8A86-A9B055527FBD}" type="datetimeFigureOut">
               <a:rPr lang="en-US" smtClean="0"/>
               <a:pPr/>
-              <a:t>11/14/2023</a:t>
+              <a:t>6/28/2024</a:t>
             </a:fld>
             <a:endParaRPr lang="en-US"/>
           </a:p>
@@ -4620,7 +4661,7 @@
             <a:fld id="{F6481F1E-66D2-4398-8A86-A9B055527FBD}" type="datetimeFigureOut">
               <a:rPr lang="en-US" smtClean="0"/>
               <a:pPr/>
-              <a:t>11/14/2023</a:t>
+              <a:t>6/28/2024</a:t>
             </a:fld>
             <a:endParaRPr lang="en-US"/>
           </a:p>
@@ -4828,7 +4869,7 @@
             <a:fld id="{F6481F1E-66D2-4398-8A86-A9B055527FBD}" type="datetimeFigureOut">
               <a:rPr lang="en-US" smtClean="0"/>
               <a:pPr/>
-              <a:t>11/14/2023</a:t>
+              <a:t>6/28/2024</a:t>
             </a:fld>
             <a:endParaRPr lang="en-US"/>
           </a:p>
@@ -17379,6 +17420,93 @@
       </p:grpSpPr>
       <p:sp>
         <p:nvSpPr>
+          <p:cNvPr id="4" name="Title 3">
+            <a:extLst>
+              <a:ext uri="{FF2B5EF4-FFF2-40B4-BE49-F238E27FC236}">
+                <a16:creationId xmlns:a16="http://schemas.microsoft.com/office/drawing/2014/main" id="{585903EF-7815-C248-B4A4-7E1C153C4AAB}"/>
+              </a:ext>
+            </a:extLst>
+          </p:cNvPr>
+          <p:cNvSpPr>
+            <a:spLocks noGrp="1"/>
+          </p:cNvSpPr>
+          <p:nvPr>
+            <p:ph type="ctrTitle"/>
+          </p:nvPr>
+        </p:nvSpPr>
+        <p:spPr/>
+        <p:txBody>
+          <a:bodyPr/>
+          <a:lstStyle/>
+          <a:p>
+            <a:r>
+              <a:rPr lang="en-US" dirty="0"/>
+              <a:t>End</a:t>
+            </a:r>
+            <a:br>
+              <a:rPr lang="en-US" dirty="0"/>
+            </a:br>
+            <a:endParaRPr lang="en-US" dirty="0"/>
+          </a:p>
+        </p:txBody>
+      </p:sp>
+      <p:sp>
+        <p:nvSpPr>
+          <p:cNvPr id="5" name="Subtitle 4">
+            <a:extLst>
+              <a:ext uri="{FF2B5EF4-FFF2-40B4-BE49-F238E27FC236}">
+                <a16:creationId xmlns:a16="http://schemas.microsoft.com/office/drawing/2014/main" id="{71D27542-6604-39B5-4EBD-BC5CF5864566}"/>
+              </a:ext>
+            </a:extLst>
+          </p:cNvPr>
+          <p:cNvSpPr>
+            <a:spLocks noGrp="1"/>
+          </p:cNvSpPr>
+          <p:nvPr>
+            <p:ph type="subTitle" idx="1"/>
+          </p:nvPr>
+        </p:nvSpPr>
+        <p:spPr/>
+        <p:txBody>
+          <a:bodyPr/>
+          <a:lstStyle/>
+          <a:p>
+            <a:endParaRPr lang="en-US"/>
+          </a:p>
+        </p:txBody>
+      </p:sp>
+    </p:spTree>
+    <p:extLst>
+      <p:ext uri="{BB962C8B-B14F-4D97-AF65-F5344CB8AC3E}">
+        <p14:creationId xmlns:p14="http://schemas.microsoft.com/office/powerpoint/2010/main" val="2246085489"/>
+      </p:ext>
+    </p:extLst>
+  </p:cSld>
+  <p:clrMapOvr>
+    <a:masterClrMapping/>
+  </p:clrMapOvr>
+</p:sld>
+</file>
+
+<file path=ppt/slides/slide25.xml><?xml version="1.0" encoding="utf-8"?>
+<p:sld xmlns:a="http://schemas.openxmlformats.org/drawingml/2006/main" xmlns:r="http://schemas.openxmlformats.org/officeDocument/2006/relationships" xmlns:p="http://schemas.openxmlformats.org/presentationml/2006/main">
+  <p:cSld>
+    <p:spTree>
+      <p:nvGrpSpPr>
+        <p:cNvPr id="1" name=""/>
+        <p:cNvGrpSpPr/>
+        <p:nvPr/>
+      </p:nvGrpSpPr>
+      <p:grpSpPr>
+        <a:xfrm>
+          <a:off x="0" y="0"/>
+          <a:ext cx="0" cy="0"/>
+          <a:chOff x="0" y="0"/>
+          <a:chExt cx="0" cy="0"/>
+        </a:xfrm>
+      </p:grpSpPr>
+      <p:sp>
+        <p:nvSpPr>
           <p:cNvPr id="2" name="Title 1"/>
           <p:cNvSpPr>
             <a:spLocks noGrp="1"/>
@@ -17828,158 +17956,6 @@
 </p:sld>
 </file>
 
-<file path=ppt/slides/slide25.xml><?xml version="1.0" encoding="utf-8"?>
-<p:sld xmlns:a="http://schemas.openxmlformats.org/drawingml/2006/main" xmlns:r="http://schemas.openxmlformats.org/officeDocument/2006/relationships" xmlns:p="http://schemas.openxmlformats.org/presentationml/2006/main">
-  <p:cSld>
-    <p:spTree>
-      <p:nvGrpSpPr>
-        <p:cNvPr id="1" name=""/>
-        <p:cNvGrpSpPr/>
-        <p:nvPr/>
-      </p:nvGrpSpPr>
-      <p:grpSpPr>
-        <a:xfrm>
-          <a:off x="0" y="0"/>
-          <a:ext cx="0" cy="0"/>
-          <a:chOff x="0" y="0"/>
-          <a:chExt cx="0" cy="0"/>
-        </a:xfrm>
-      </p:grpSpPr>
-      <p:sp>
-        <p:nvSpPr>
-          <p:cNvPr id="2" name="Title 1"/>
-          <p:cNvSpPr>
-            <a:spLocks noGrp="1"/>
-          </p:cNvSpPr>
-          <p:nvPr>
-            <p:ph type="title"/>
-          </p:nvPr>
-        </p:nvSpPr>
-        <p:spPr/>
-        <p:txBody>
-          <a:bodyPr/>
-          <a:lstStyle/>
-          <a:p>
-            <a:r>
-              <a:rPr lang="en-US" dirty="0"/>
-              <a:t>Question 223.39.6.5</a:t>
-            </a:r>
-          </a:p>
-        </p:txBody>
-      </p:sp>
-      <p:sp>
-        <p:nvSpPr>
-          <p:cNvPr id="3" name="Content Placeholder 2"/>
-          <p:cNvSpPr>
-            <a:spLocks noGrp="1"/>
-          </p:cNvSpPr>
-          <p:nvPr>
-            <p:ph sz="half" idx="1"/>
-          </p:nvPr>
-        </p:nvSpPr>
-        <p:spPr/>
-        <p:txBody>
-          <a:bodyPr/>
-          <a:lstStyle/>
-          <a:p>
-            <a:pPr marL="0" indent="0">
-              <a:buNone/>
-            </a:pPr>
-            <a:r>
-              <a:rPr lang="en-US" dirty="0"/>
-              <a:t>An electric circuit creates a magnetic field. As the current in the field changes, so does the field. Does this mean you can tell something about what the circuit is doing from relatively far away from the circuit?</a:t>
-            </a:r>
-          </a:p>
-        </p:txBody>
-      </p:sp>
-      <p:sp>
-        <p:nvSpPr>
-          <p:cNvPr id="4" name="Content Placeholder 3"/>
-          <p:cNvSpPr>
-            <a:spLocks noGrp="1"/>
-          </p:cNvSpPr>
-          <p:nvPr>
-            <p:ph sz="half" idx="2"/>
-          </p:nvPr>
-        </p:nvSpPr>
-        <p:spPr/>
-        <p:txBody>
-          <a:bodyPr/>
-          <a:lstStyle/>
-          <a:p>
-            <a:pPr marL="514350" indent="-514350">
-              <a:buFont typeface="+mj-lt"/>
-              <a:buAutoNum type="alphaLcParenR"/>
-            </a:pPr>
-            <a:r>
-              <a:rPr lang="en-US" dirty="0"/>
-              <a:t>Yes</a:t>
-            </a:r>
-          </a:p>
-          <a:p>
-            <a:pPr marL="514350" indent="-514350">
-              <a:buFont typeface="+mj-lt"/>
-              <a:buAutoNum type="alphaLcParenR"/>
-            </a:pPr>
-            <a:r>
-              <a:rPr lang="en-US" dirty="0"/>
-              <a:t>No</a:t>
-            </a:r>
-          </a:p>
-          <a:p>
-            <a:pPr marL="514350" indent="-514350">
-              <a:buFont typeface="+mj-lt"/>
-              <a:buAutoNum type="alphaLcParenR"/>
-            </a:pPr>
-            <a:r>
-              <a:rPr lang="en-US" dirty="0"/>
-              <a:t>Maybe</a:t>
-            </a:r>
-          </a:p>
-        </p:txBody>
-      </p:sp>
-      <p:sp>
-        <p:nvSpPr>
-          <p:cNvPr id="5" name="Slide Number Placeholder 4"/>
-          <p:cNvSpPr>
-            <a:spLocks noGrp="1"/>
-          </p:cNvSpPr>
-          <p:nvPr>
-            <p:ph type="sldNum" sz="quarter" idx="12"/>
-          </p:nvPr>
-        </p:nvSpPr>
-        <p:spPr/>
-        <p:txBody>
-          <a:bodyPr/>
-          <a:lstStyle/>
-          <a:p>
-            <a:pPr>
-              <a:defRPr/>
-            </a:pPr>
-            <a:fld id="{3EA66945-4ABE-4D1C-8E1E-630F12976FC5}" type="slidenum">
-              <a:rPr lang="en-US" smtClean="0"/>
-              <a:pPr>
-                <a:defRPr/>
-              </a:pPr>
-              <a:t>25</a:t>
-            </a:fld>
-            <a:endParaRPr lang="en-US"/>
-          </a:p>
-        </p:txBody>
-      </p:sp>
-    </p:spTree>
-    <p:extLst>
-      <p:ext uri="{BB962C8B-B14F-4D97-AF65-F5344CB8AC3E}">
-        <p14:creationId xmlns:p14="http://schemas.microsoft.com/office/powerpoint/2010/main" val="598932918"/>
-      </p:ext>
-    </p:extLst>
-  </p:cSld>
-  <p:clrMapOvr>
-    <a:masterClrMapping/>
-  </p:clrMapOvr>
-</p:sld>
-</file>
-
 <file path=ppt/slides/slide26.xml><?xml version="1.0" encoding="utf-8"?>
 <p:sld xmlns:a="http://schemas.openxmlformats.org/drawingml/2006/main" xmlns:r="http://schemas.openxmlformats.org/officeDocument/2006/relationships" xmlns:p="http://schemas.openxmlformats.org/presentationml/2006/main">
   <p:cSld>
@@ -17999,9 +17975,9 @@
       </p:grpSpPr>
       <p:sp>
         <p:nvSpPr>
-          <p:cNvPr id="2405378" name="Rectangle 2"/>
+          <p:cNvPr id="2" name="Title 1"/>
           <p:cNvSpPr>
-            <a:spLocks noGrp="1" noChangeArrowheads="1"/>
+            <a:spLocks noGrp="1"/>
           </p:cNvSpPr>
           <p:nvPr>
             <p:ph type="title"/>
@@ -18013,87 +17989,118 @@
           <a:lstStyle/>
           <a:p>
             <a:r>
-              <a:rPr lang="en-US"/>
-              <a:t>Question 18.3</a:t>
-            </a:r>
-          </a:p>
-        </p:txBody>
-      </p:sp>
-      <p:sp>
-        <p:nvSpPr>
-          <p:cNvPr id="2405379" name="Rectangle 3"/>
+              <a:rPr lang="en-US" dirty="0"/>
+              <a:t>Question 223.39.6.5</a:t>
+            </a:r>
+          </a:p>
+        </p:txBody>
+      </p:sp>
+      <p:sp>
+        <p:nvSpPr>
+          <p:cNvPr id="3" name="Content Placeholder 2"/>
           <p:cNvSpPr>
-            <a:spLocks noGrp="1" noChangeArrowheads="1"/>
+            <a:spLocks noGrp="1"/>
           </p:cNvSpPr>
           <p:nvPr>
-            <p:ph idx="1"/>
+            <p:ph sz="half" idx="1"/>
           </p:nvPr>
         </p:nvSpPr>
-        <p:spPr>
-          <a:xfrm>
-            <a:off x="990600" y="1181100"/>
-            <a:ext cx="7162800" cy="4114800"/>
-          </a:xfrm>
-        </p:spPr>
+        <p:spPr/>
         <p:txBody>
           <a:bodyPr/>
           <a:lstStyle/>
           <a:p>
-            <a:pPr marL="381000" indent="-381000">
-              <a:buFont typeface="Monotype Sorts" pitchFamily="2" charset="2"/>
+            <a:pPr marL="0" indent="0">
               <a:buNone/>
             </a:pPr>
             <a:r>
-              <a:rPr lang="en-US" sz="2800"/>
-              <a:t>We have current flowing through  a wire. From our study of resistance, we can say…</a:t>
-            </a:r>
-          </a:p>
-          <a:p>
-            <a:pPr marL="381000" indent="-381000">
-              <a:buClr>
-                <a:schemeClr val="tx1"/>
-              </a:buClr>
-              <a:buFont typeface="Monotype Sorts" pitchFamily="2" charset="2"/>
+              <a:rPr lang="en-US" dirty="0"/>
+              <a:t>An electric circuit creates a magnetic field. As the current in the field changes, so does the field. Does this mean you can tell something about what the circuit is doing from relatively far away from the circuit?</a:t>
+            </a:r>
+          </a:p>
+        </p:txBody>
+      </p:sp>
+      <p:sp>
+        <p:nvSpPr>
+          <p:cNvPr id="4" name="Content Placeholder 3"/>
+          <p:cNvSpPr>
+            <a:spLocks noGrp="1"/>
+          </p:cNvSpPr>
+          <p:nvPr>
+            <p:ph sz="half" idx="2"/>
+          </p:nvPr>
+        </p:nvSpPr>
+        <p:spPr/>
+        <p:txBody>
+          <a:bodyPr/>
+          <a:lstStyle/>
+          <a:p>
+            <a:pPr marL="514350" indent="-514350">
+              <a:buFont typeface="+mj-lt"/>
               <a:buAutoNum type="alphaLcParenR"/>
             </a:pPr>
             <a:r>
-              <a:rPr lang="en-US" sz="2800"/>
-              <a:t>The free charge carriers must be on the surface of the wire</a:t>
-            </a:r>
-          </a:p>
-          <a:p>
-            <a:pPr marL="381000" indent="-381000">
-              <a:buClr>
-                <a:schemeClr val="tx1"/>
-              </a:buClr>
-              <a:buFont typeface="Monotype Sorts" pitchFamily="2" charset="2"/>
+              <a:rPr lang="en-US" dirty="0"/>
+              <a:t>Yes</a:t>
+            </a:r>
+          </a:p>
+          <a:p>
+            <a:pPr marL="514350" indent="-514350">
+              <a:buFont typeface="+mj-lt"/>
               <a:buAutoNum type="alphaLcParenR"/>
             </a:pPr>
             <a:r>
-              <a:rPr lang="en-US" sz="2800"/>
-              <a:t>The free charge must travel through the entire cross-sectional area of the wire</a:t>
-            </a:r>
-          </a:p>
-          <a:p>
-            <a:pPr marL="381000" indent="-381000">
-              <a:buClr>
-                <a:schemeClr val="tx1"/>
-              </a:buClr>
-              <a:buFont typeface="Monotype Sorts" pitchFamily="2" charset="2"/>
+              <a:rPr lang="en-US" dirty="0"/>
+              <a:t>No</a:t>
+            </a:r>
+          </a:p>
+          <a:p>
+            <a:pPr marL="514350" indent="-514350">
+              <a:buFont typeface="+mj-lt"/>
               <a:buAutoNum type="alphaLcParenR"/>
             </a:pPr>
             <a:r>
-              <a:rPr lang="en-US" sz="2800"/>
-              <a:t>The free charge floats just off the surface in-between the wire and its insulating cover</a:t>
-            </a:r>
-          </a:p>
-          <a:p>
-            <a:pPr marL="381000" indent="-381000"/>
-            <a:endParaRPr lang="en-US" sz="2800"/>
+              <a:rPr lang="en-US" dirty="0"/>
+              <a:t>Maybe</a:t>
+            </a:r>
+          </a:p>
+        </p:txBody>
+      </p:sp>
+      <p:sp>
+        <p:nvSpPr>
+          <p:cNvPr id="5" name="Slide Number Placeholder 4"/>
+          <p:cNvSpPr>
+            <a:spLocks noGrp="1"/>
+          </p:cNvSpPr>
+          <p:nvPr>
+            <p:ph type="sldNum" sz="quarter" idx="12"/>
+          </p:nvPr>
+        </p:nvSpPr>
+        <p:spPr/>
+        <p:txBody>
+          <a:bodyPr/>
+          <a:lstStyle/>
+          <a:p>
+            <a:pPr>
+              <a:defRPr/>
+            </a:pPr>
+            <a:fld id="{3EA66945-4ABE-4D1C-8E1E-630F12976FC5}" type="slidenum">
+              <a:rPr lang="en-US" smtClean="0"/>
+              <a:pPr>
+                <a:defRPr/>
+              </a:pPr>
+              <a:t>26</a:t>
+            </a:fld>
+            <a:endParaRPr lang="en-US"/>
           </a:p>
         </p:txBody>
       </p:sp>
     </p:spTree>
+    <p:extLst>
+      <p:ext uri="{BB962C8B-B14F-4D97-AF65-F5344CB8AC3E}">
+        <p14:creationId xmlns:p14="http://schemas.microsoft.com/office/powerpoint/2010/main" val="598932918"/>
+      </p:ext>
+    </p:extLst>
   </p:cSld>
   <p:clrMapOvr>
     <a:masterClrMapping/>
@@ -18120,6 +18127,127 @@
       </p:grpSpPr>
       <p:sp>
         <p:nvSpPr>
+          <p:cNvPr id="2405378" name="Rectangle 2"/>
+          <p:cNvSpPr>
+            <a:spLocks noGrp="1" noChangeArrowheads="1"/>
+          </p:cNvSpPr>
+          <p:nvPr>
+            <p:ph type="title"/>
+          </p:nvPr>
+        </p:nvSpPr>
+        <p:spPr/>
+        <p:txBody>
+          <a:bodyPr/>
+          <a:lstStyle/>
+          <a:p>
+            <a:r>
+              <a:rPr lang="en-US"/>
+              <a:t>Question 18.3</a:t>
+            </a:r>
+          </a:p>
+        </p:txBody>
+      </p:sp>
+      <p:sp>
+        <p:nvSpPr>
+          <p:cNvPr id="2405379" name="Rectangle 3"/>
+          <p:cNvSpPr>
+            <a:spLocks noGrp="1" noChangeArrowheads="1"/>
+          </p:cNvSpPr>
+          <p:nvPr>
+            <p:ph idx="1"/>
+          </p:nvPr>
+        </p:nvSpPr>
+        <p:spPr>
+          <a:xfrm>
+            <a:off x="990600" y="1181100"/>
+            <a:ext cx="7162800" cy="4114800"/>
+          </a:xfrm>
+        </p:spPr>
+        <p:txBody>
+          <a:bodyPr/>
+          <a:lstStyle/>
+          <a:p>
+            <a:pPr marL="381000" indent="-381000">
+              <a:buFont typeface="Monotype Sorts" pitchFamily="2" charset="2"/>
+              <a:buNone/>
+            </a:pPr>
+            <a:r>
+              <a:rPr lang="en-US" sz="2800"/>
+              <a:t>We have current flowing through  a wire. From our study of resistance, we can say…</a:t>
+            </a:r>
+          </a:p>
+          <a:p>
+            <a:pPr marL="381000" indent="-381000">
+              <a:buClr>
+                <a:schemeClr val="tx1"/>
+              </a:buClr>
+              <a:buFont typeface="Monotype Sorts" pitchFamily="2" charset="2"/>
+              <a:buAutoNum type="alphaLcParenR"/>
+            </a:pPr>
+            <a:r>
+              <a:rPr lang="en-US" sz="2800"/>
+              <a:t>The free charge carriers must be on the surface of the wire</a:t>
+            </a:r>
+          </a:p>
+          <a:p>
+            <a:pPr marL="381000" indent="-381000">
+              <a:buClr>
+                <a:schemeClr val="tx1"/>
+              </a:buClr>
+              <a:buFont typeface="Monotype Sorts" pitchFamily="2" charset="2"/>
+              <a:buAutoNum type="alphaLcParenR"/>
+            </a:pPr>
+            <a:r>
+              <a:rPr lang="en-US" sz="2800"/>
+              <a:t>The free charge must travel through the entire cross-sectional area of the wire</a:t>
+            </a:r>
+          </a:p>
+          <a:p>
+            <a:pPr marL="381000" indent="-381000">
+              <a:buClr>
+                <a:schemeClr val="tx1"/>
+              </a:buClr>
+              <a:buFont typeface="Monotype Sorts" pitchFamily="2" charset="2"/>
+              <a:buAutoNum type="alphaLcParenR"/>
+            </a:pPr>
+            <a:r>
+              <a:rPr lang="en-US" sz="2800"/>
+              <a:t>The free charge floats just off the surface in-between the wire and its insulating cover</a:t>
+            </a:r>
+          </a:p>
+          <a:p>
+            <a:pPr marL="381000" indent="-381000"/>
+            <a:endParaRPr lang="en-US" sz="2800"/>
+          </a:p>
+        </p:txBody>
+      </p:sp>
+    </p:spTree>
+  </p:cSld>
+  <p:clrMapOvr>
+    <a:masterClrMapping/>
+  </p:clrMapOvr>
+</p:sld>
+</file>
+
+<file path=ppt/slides/slide28.xml><?xml version="1.0" encoding="utf-8"?>
+<p:sld xmlns:a="http://schemas.openxmlformats.org/drawingml/2006/main" xmlns:r="http://schemas.openxmlformats.org/officeDocument/2006/relationships" xmlns:p="http://schemas.openxmlformats.org/presentationml/2006/main">
+  <p:cSld>
+    <p:spTree>
+      <p:nvGrpSpPr>
+        <p:cNvPr id="1" name=""/>
+        <p:cNvGrpSpPr/>
+        <p:nvPr/>
+      </p:nvGrpSpPr>
+      <p:grpSpPr>
+        <a:xfrm>
+          <a:off x="0" y="0"/>
+          <a:ext cx="0" cy="0"/>
+          <a:chOff x="0" y="0"/>
+          <a:chExt cx="0" cy="0"/>
+        </a:xfrm>
+      </p:grpSpPr>
+      <p:sp>
+        <p:nvSpPr>
           <p:cNvPr id="1562627" name="Rectangle 3"/>
           <p:cNvSpPr>
             <a:spLocks noGrp="1" noChangeArrowheads="1"/>
@@ -18858,7 +18986,7 @@
 </p:sld>
 </file>
 
-<file path=ppt/slides/slide28.xml><?xml version="1.0" encoding="utf-8"?>
+<file path=ppt/slides/slide29.xml><?xml version="1.0" encoding="utf-8"?>
 <p:sld xmlns:a="http://schemas.openxmlformats.org/drawingml/2006/main" xmlns:r="http://schemas.openxmlformats.org/officeDocument/2006/relationships" xmlns:p="http://schemas.openxmlformats.org/presentationml/2006/main">
   <p:cSld>
     <p:spTree>
@@ -19921,402 +20049,6 @@
 </p:sld>
 </file>
 
-<file path=ppt/slides/slide29.xml><?xml version="1.0" encoding="utf-8"?>
-<p:sld xmlns:a="http://schemas.openxmlformats.org/drawingml/2006/main" xmlns:r="http://schemas.openxmlformats.org/officeDocument/2006/relationships" xmlns:p="http://schemas.openxmlformats.org/presentationml/2006/main">
-  <p:cSld>
-    <p:spTree>
-      <p:nvGrpSpPr>
-        <p:cNvPr id="1" name=""/>
-        <p:cNvGrpSpPr/>
-        <p:nvPr/>
-      </p:nvGrpSpPr>
-      <p:grpSpPr>
-        <a:xfrm>
-          <a:off x="0" y="0"/>
-          <a:ext cx="0" cy="0"/>
-          <a:chOff x="0" y="0"/>
-          <a:chExt cx="0" cy="0"/>
-        </a:xfrm>
-      </p:grpSpPr>
-      <p:sp>
-        <p:nvSpPr>
-          <p:cNvPr id="1566723" name="Rectangle 3"/>
-          <p:cNvSpPr>
-            <a:spLocks noGrp="1" noChangeArrowheads="1"/>
-          </p:cNvSpPr>
-          <p:nvPr>
-            <p:ph type="title"/>
-          </p:nvPr>
-        </p:nvSpPr>
-        <p:spPr>
-          <a:xfrm>
-            <a:off x="660400" y="0"/>
-            <a:ext cx="8050213" cy="838200"/>
-          </a:xfrm>
-          <a:noFill/>
-          <a:ln/>
-        </p:spPr>
-        <p:txBody>
-          <a:bodyPr/>
-          <a:lstStyle/>
-          <a:p>
-            <a:pPr>
-              <a:lnSpc>
-                <a:spcPct val="90000"/>
-              </a:lnSpc>
-            </a:pPr>
-            <a:r>
-              <a:rPr lang="en-US" sz="2800" i="1"/>
-              <a:t>ConcepTest 18.3b	</a:t>
-            </a:r>
-            <a:r>
-              <a:rPr lang="en-US" sz="2800">
-                <a:solidFill>
-                  <a:schemeClr val="accent2"/>
-                </a:solidFill>
-              </a:rPr>
-              <a:t>Wires II </a:t>
-            </a:r>
-          </a:p>
-        </p:txBody>
-      </p:sp>
-      <p:sp>
-        <p:nvSpPr>
-          <p:cNvPr id="1566724" name="Rectangle 4"/>
-          <p:cNvSpPr>
-            <a:spLocks noGrp="1" noChangeArrowheads="1"/>
-          </p:cNvSpPr>
-          <p:nvPr>
-            <p:ph idx="1"/>
-          </p:nvPr>
-        </p:nvSpPr>
-        <p:spPr>
-          <a:xfrm>
-            <a:off x="0" y="906463"/>
-            <a:ext cx="4691063" cy="2395537"/>
-          </a:xfrm>
-          <a:noFill/>
-          <a:ln/>
-        </p:spPr>
-        <p:txBody>
-          <a:bodyPr>
-            <a:normAutofit fontScale="77500" lnSpcReduction="20000"/>
-          </a:bodyPr>
-          <a:lstStyle/>
-          <a:p>
-            <a:pPr marL="401638" indent="-401638">
-              <a:lnSpc>
-                <a:spcPct val="130000"/>
-              </a:lnSpc>
-              <a:spcBef>
-                <a:spcPct val="50000"/>
-              </a:spcBef>
-              <a:buFont typeface="Monotype Sorts" pitchFamily="2" charset="2"/>
-              <a:buNone/>
-            </a:pPr>
-            <a:r>
-              <a:rPr lang="en-US" b="1">
-                <a:effectLst>
-                  <a:outerShdw blurRad="38100" dist="38100" dir="2700000" algn="tl">
-                    <a:srgbClr val="000000"/>
-                  </a:outerShdw>
-                </a:effectLst>
-              </a:rPr>
-              <a:t>	A wire of resistance </a:t>
-            </a:r>
-            <a:r>
-              <a:rPr lang="en-US" b="1" i="1">
-                <a:effectLst>
-                  <a:outerShdw blurRad="38100" dist="38100" dir="2700000" algn="tl">
-                    <a:srgbClr val="000000"/>
-                  </a:outerShdw>
-                </a:effectLst>
-              </a:rPr>
-              <a:t>R</a:t>
-            </a:r>
-            <a:r>
-              <a:rPr lang="en-US" b="1">
-                <a:effectLst>
-                  <a:outerShdw blurRad="38100" dist="38100" dir="2700000" algn="tl">
-                    <a:srgbClr val="000000"/>
-                  </a:outerShdw>
-                </a:effectLst>
-              </a:rPr>
-              <a:t> is stretched uniformly (keeping its volume constant) until it is twice its original length.  What happens to the resistance?</a:t>
-            </a:r>
-            <a:endParaRPr lang="en-US" sz="2200" b="1">
-              <a:effectLst>
-                <a:outerShdw blurRad="38100" dist="38100" dir="2700000" algn="tl">
-                  <a:srgbClr val="000000"/>
-                </a:outerShdw>
-              </a:effectLst>
-            </a:endParaRPr>
-          </a:p>
-        </p:txBody>
-      </p:sp>
-      <p:sp>
-        <p:nvSpPr>
-          <p:cNvPr id="1566725" name="Text Box 5"/>
-          <p:cNvSpPr txBox="1">
-            <a:spLocks noChangeArrowheads="1"/>
-          </p:cNvSpPr>
-          <p:nvPr/>
-        </p:nvSpPr>
-        <p:spPr bwMode="auto">
-          <a:xfrm>
-            <a:off x="4902200" y="838200"/>
-            <a:ext cx="4241800" cy="2076450"/>
-          </a:xfrm>
-          <a:prstGeom prst="rect">
-            <a:avLst/>
-          </a:prstGeom>
-          <a:noFill/>
-          <a:ln w="9525">
-            <a:noFill/>
-            <a:miter lim="800000"/>
-            <a:headEnd/>
-            <a:tailEnd/>
-          </a:ln>
-          <a:effectLst/>
-        </p:spPr>
-        <p:txBody>
-          <a:bodyPr>
-            <a:spAutoFit/>
-          </a:bodyPr>
-          <a:lstStyle/>
-          <a:p>
-            <a:pPr>
-              <a:lnSpc>
-                <a:spcPct val="130000"/>
-              </a:lnSpc>
-            </a:pPr>
-            <a:r>
-              <a:rPr lang="en-US" sz="2000" b="1">
-                <a:solidFill>
-                  <a:schemeClr val="tx2"/>
-                </a:solidFill>
-              </a:rPr>
-              <a:t>1)  </a:t>
-            </a:r>
-            <a:r>
-              <a:rPr lang="en-US" sz="2000" b="1">
-                <a:solidFill>
-                  <a:schemeClr val="tx2"/>
-                </a:solidFill>
-                <a:effectLst>
-                  <a:outerShdw blurRad="38100" dist="38100" dir="2700000" algn="tl">
-                    <a:srgbClr val="000000"/>
-                  </a:outerShdw>
-                </a:effectLst>
-              </a:rPr>
-              <a:t>it decreases</a:t>
-            </a:r>
-            <a:r>
-              <a:rPr lang="en-US" sz="2000" b="1">
-                <a:solidFill>
-                  <a:schemeClr val="tx2"/>
-                </a:solidFill>
-              </a:rPr>
-              <a:t> </a:t>
-            </a:r>
-            <a:r>
-              <a:rPr lang="en-US" sz="2000" b="1">
-                <a:solidFill>
-                  <a:schemeClr val="tx2"/>
-                </a:solidFill>
-                <a:effectLst>
-                  <a:outerShdw blurRad="38100" dist="38100" dir="2700000" algn="tl">
-                    <a:srgbClr val="000000"/>
-                  </a:outerShdw>
-                </a:effectLst>
-              </a:rPr>
-              <a:t>by a factor 4</a:t>
-            </a:r>
-            <a:endParaRPr lang="en-US" sz="2000" b="1">
-              <a:solidFill>
-                <a:schemeClr val="tx2"/>
-              </a:solidFill>
-            </a:endParaRPr>
-          </a:p>
-          <a:p>
-            <a:pPr>
-              <a:lnSpc>
-                <a:spcPct val="130000"/>
-              </a:lnSpc>
-            </a:pPr>
-            <a:r>
-              <a:rPr lang="en-US" sz="2000" b="1">
-                <a:solidFill>
-                  <a:schemeClr val="tx2"/>
-                </a:solidFill>
-              </a:rPr>
-              <a:t>2)  </a:t>
-            </a:r>
-            <a:r>
-              <a:rPr lang="en-US" sz="2000" b="1">
-                <a:solidFill>
-                  <a:schemeClr val="tx2"/>
-                </a:solidFill>
-                <a:effectLst>
-                  <a:outerShdw blurRad="38100" dist="38100" dir="2700000" algn="tl">
-                    <a:srgbClr val="000000"/>
-                  </a:outerShdw>
-                </a:effectLst>
-              </a:rPr>
-              <a:t>it decreases</a:t>
-            </a:r>
-            <a:r>
-              <a:rPr lang="en-US" sz="2000" b="1">
-                <a:solidFill>
-                  <a:schemeClr val="tx2"/>
-                </a:solidFill>
-              </a:rPr>
-              <a:t> </a:t>
-            </a:r>
-            <a:r>
-              <a:rPr lang="en-US" sz="2000" b="1">
-                <a:solidFill>
-                  <a:schemeClr val="tx2"/>
-                </a:solidFill>
-                <a:effectLst>
-                  <a:outerShdw blurRad="38100" dist="38100" dir="2700000" algn="tl">
-                    <a:srgbClr val="000000"/>
-                  </a:outerShdw>
-                </a:effectLst>
-              </a:rPr>
-              <a:t>by a factor 2</a:t>
-            </a:r>
-            <a:endParaRPr lang="en-US" sz="2000" b="1">
-              <a:solidFill>
-                <a:schemeClr val="tx2"/>
-              </a:solidFill>
-            </a:endParaRPr>
-          </a:p>
-          <a:p>
-            <a:pPr>
-              <a:lnSpc>
-                <a:spcPct val="130000"/>
-              </a:lnSpc>
-            </a:pPr>
-            <a:r>
-              <a:rPr lang="en-US" sz="2000" b="1">
-                <a:solidFill>
-                  <a:schemeClr val="tx2"/>
-                </a:solidFill>
-              </a:rPr>
-              <a:t>3)  </a:t>
-            </a:r>
-            <a:r>
-              <a:rPr lang="en-US" sz="2000" b="1">
-                <a:solidFill>
-                  <a:schemeClr val="tx2"/>
-                </a:solidFill>
-                <a:effectLst>
-                  <a:outerShdw blurRad="38100" dist="38100" dir="2700000" algn="tl">
-                    <a:srgbClr val="000000"/>
-                  </a:outerShdw>
-                </a:effectLst>
-              </a:rPr>
-              <a:t>it stays the same</a:t>
-            </a:r>
-          </a:p>
-          <a:p>
-            <a:pPr>
-              <a:lnSpc>
-                <a:spcPct val="130000"/>
-              </a:lnSpc>
-            </a:pPr>
-            <a:r>
-              <a:rPr lang="en-US" sz="2000" b="1">
-                <a:solidFill>
-                  <a:schemeClr val="tx2"/>
-                </a:solidFill>
-                <a:effectLst>
-                  <a:outerShdw blurRad="38100" dist="38100" dir="2700000" algn="tl">
-                    <a:srgbClr val="000000"/>
-                  </a:outerShdw>
-                </a:effectLst>
-              </a:rPr>
-              <a:t>4)  it increases</a:t>
-            </a:r>
-            <a:r>
-              <a:rPr lang="en-US" sz="2000" b="1">
-                <a:solidFill>
-                  <a:schemeClr val="tx2"/>
-                </a:solidFill>
-              </a:rPr>
-              <a:t> </a:t>
-            </a:r>
-            <a:r>
-              <a:rPr lang="en-US" sz="2000" b="1">
-                <a:solidFill>
-                  <a:schemeClr val="tx2"/>
-                </a:solidFill>
-                <a:effectLst>
-                  <a:outerShdw blurRad="38100" dist="38100" dir="2700000" algn="tl">
-                    <a:srgbClr val="000000"/>
-                  </a:outerShdw>
-                </a:effectLst>
-              </a:rPr>
-              <a:t>by a factor 2</a:t>
-            </a:r>
-          </a:p>
-          <a:p>
-            <a:pPr>
-              <a:lnSpc>
-                <a:spcPct val="130000"/>
-              </a:lnSpc>
-            </a:pPr>
-            <a:r>
-              <a:rPr lang="en-US" sz="2000" b="1">
-                <a:solidFill>
-                  <a:schemeClr val="tx2"/>
-                </a:solidFill>
-                <a:effectLst>
-                  <a:outerShdw blurRad="38100" dist="38100" dir="2700000" algn="tl">
-                    <a:srgbClr val="000000"/>
-                  </a:outerShdw>
-                </a:effectLst>
-              </a:rPr>
-              <a:t>5)  it increases</a:t>
-            </a:r>
-            <a:r>
-              <a:rPr lang="en-US" sz="2000" b="1">
-                <a:solidFill>
-                  <a:schemeClr val="tx2"/>
-                </a:solidFill>
-              </a:rPr>
-              <a:t> </a:t>
-            </a:r>
-            <a:r>
-              <a:rPr lang="en-US" sz="2000" b="1">
-                <a:solidFill>
-                  <a:schemeClr val="tx2"/>
-                </a:solidFill>
-                <a:effectLst>
-                  <a:outerShdw blurRad="38100" dist="38100" dir="2700000" algn="tl">
-                    <a:srgbClr val="000000"/>
-                  </a:outerShdw>
-                </a:effectLst>
-              </a:rPr>
-              <a:t>by a factor 4</a:t>
-            </a:r>
-            <a:endParaRPr lang="en-US" b="1">
-              <a:solidFill>
-                <a:schemeClr val="tx2"/>
-              </a:solidFill>
-            </a:endParaRPr>
-          </a:p>
-        </p:txBody>
-      </p:sp>
-    </p:spTree>
-  </p:cSld>
-  <p:clrMapOvr>
-    <a:masterClrMapping/>
-  </p:clrMapOvr>
-</p:sld>
-</file>
-
 <file path=ppt/slides/slide3.xml><?xml version="1.0" encoding="utf-8"?>
 <p:sld xmlns:a="http://schemas.openxmlformats.org/drawingml/2006/main" xmlns:r="http://schemas.openxmlformats.org/officeDocument/2006/relationships" xmlns:p="http://schemas.openxmlformats.org/presentationml/2006/main">
   <p:cSld>
@@ -20445,6 +20177,402 @@
 </file>
 
 <file path=ppt/slides/slide30.xml><?xml version="1.0" encoding="utf-8"?>
+<p:sld xmlns:a="http://schemas.openxmlformats.org/drawingml/2006/main" xmlns:r="http://schemas.openxmlformats.org/officeDocument/2006/relationships" xmlns:p="http://schemas.openxmlformats.org/presentationml/2006/main">
+  <p:cSld>
+    <p:spTree>
+      <p:nvGrpSpPr>
+        <p:cNvPr id="1" name=""/>
+        <p:cNvGrpSpPr/>
+        <p:nvPr/>
+      </p:nvGrpSpPr>
+      <p:grpSpPr>
+        <a:xfrm>
+          <a:off x="0" y="0"/>
+          <a:ext cx="0" cy="0"/>
+          <a:chOff x="0" y="0"/>
+          <a:chExt cx="0" cy="0"/>
+        </a:xfrm>
+      </p:grpSpPr>
+      <p:sp>
+        <p:nvSpPr>
+          <p:cNvPr id="1566723" name="Rectangle 3"/>
+          <p:cNvSpPr>
+            <a:spLocks noGrp="1" noChangeArrowheads="1"/>
+          </p:cNvSpPr>
+          <p:nvPr>
+            <p:ph type="title"/>
+          </p:nvPr>
+        </p:nvSpPr>
+        <p:spPr>
+          <a:xfrm>
+            <a:off x="660400" y="0"/>
+            <a:ext cx="8050213" cy="838200"/>
+          </a:xfrm>
+          <a:noFill/>
+          <a:ln/>
+        </p:spPr>
+        <p:txBody>
+          <a:bodyPr/>
+          <a:lstStyle/>
+          <a:p>
+            <a:pPr>
+              <a:lnSpc>
+                <a:spcPct val="90000"/>
+              </a:lnSpc>
+            </a:pPr>
+            <a:r>
+              <a:rPr lang="en-US" sz="2800" i="1"/>
+              <a:t>ConcepTest 18.3b	</a:t>
+            </a:r>
+            <a:r>
+              <a:rPr lang="en-US" sz="2800">
+                <a:solidFill>
+                  <a:schemeClr val="accent2"/>
+                </a:solidFill>
+              </a:rPr>
+              <a:t>Wires II </a:t>
+            </a:r>
+          </a:p>
+        </p:txBody>
+      </p:sp>
+      <p:sp>
+        <p:nvSpPr>
+          <p:cNvPr id="1566724" name="Rectangle 4"/>
+          <p:cNvSpPr>
+            <a:spLocks noGrp="1" noChangeArrowheads="1"/>
+          </p:cNvSpPr>
+          <p:nvPr>
+            <p:ph idx="1"/>
+          </p:nvPr>
+        </p:nvSpPr>
+        <p:spPr>
+          <a:xfrm>
+            <a:off x="0" y="906463"/>
+            <a:ext cx="4691063" cy="2395537"/>
+          </a:xfrm>
+          <a:noFill/>
+          <a:ln/>
+        </p:spPr>
+        <p:txBody>
+          <a:bodyPr>
+            <a:normAutofit fontScale="77500" lnSpcReduction="20000"/>
+          </a:bodyPr>
+          <a:lstStyle/>
+          <a:p>
+            <a:pPr marL="401638" indent="-401638">
+              <a:lnSpc>
+                <a:spcPct val="130000"/>
+              </a:lnSpc>
+              <a:spcBef>
+                <a:spcPct val="50000"/>
+              </a:spcBef>
+              <a:buFont typeface="Monotype Sorts" pitchFamily="2" charset="2"/>
+              <a:buNone/>
+            </a:pPr>
+            <a:r>
+              <a:rPr lang="en-US" b="1">
+                <a:effectLst>
+                  <a:outerShdw blurRad="38100" dist="38100" dir="2700000" algn="tl">
+                    <a:srgbClr val="000000"/>
+                  </a:outerShdw>
+                </a:effectLst>
+              </a:rPr>
+              <a:t>	A wire of resistance </a:t>
+            </a:r>
+            <a:r>
+              <a:rPr lang="en-US" b="1" i="1">
+                <a:effectLst>
+                  <a:outerShdw blurRad="38100" dist="38100" dir="2700000" algn="tl">
+                    <a:srgbClr val="000000"/>
+                  </a:outerShdw>
+                </a:effectLst>
+              </a:rPr>
+              <a:t>R</a:t>
+            </a:r>
+            <a:r>
+              <a:rPr lang="en-US" b="1">
+                <a:effectLst>
+                  <a:outerShdw blurRad="38100" dist="38100" dir="2700000" algn="tl">
+                    <a:srgbClr val="000000"/>
+                  </a:outerShdw>
+                </a:effectLst>
+              </a:rPr>
+              <a:t> is stretched uniformly (keeping its volume constant) until it is twice its original length.  What happens to the resistance?</a:t>
+            </a:r>
+            <a:endParaRPr lang="en-US" sz="2200" b="1">
+              <a:effectLst>
+                <a:outerShdw blurRad="38100" dist="38100" dir="2700000" algn="tl">
+                  <a:srgbClr val="000000"/>
+                </a:outerShdw>
+              </a:effectLst>
+            </a:endParaRPr>
+          </a:p>
+        </p:txBody>
+      </p:sp>
+      <p:sp>
+        <p:nvSpPr>
+          <p:cNvPr id="1566725" name="Text Box 5"/>
+          <p:cNvSpPr txBox="1">
+            <a:spLocks noChangeArrowheads="1"/>
+          </p:cNvSpPr>
+          <p:nvPr/>
+        </p:nvSpPr>
+        <p:spPr bwMode="auto">
+          <a:xfrm>
+            <a:off x="4902200" y="838200"/>
+            <a:ext cx="4241800" cy="2076450"/>
+          </a:xfrm>
+          <a:prstGeom prst="rect">
+            <a:avLst/>
+          </a:prstGeom>
+          <a:noFill/>
+          <a:ln w="9525">
+            <a:noFill/>
+            <a:miter lim="800000"/>
+            <a:headEnd/>
+            <a:tailEnd/>
+          </a:ln>
+          <a:effectLst/>
+        </p:spPr>
+        <p:txBody>
+          <a:bodyPr>
+            <a:spAutoFit/>
+          </a:bodyPr>
+          <a:lstStyle/>
+          <a:p>
+            <a:pPr>
+              <a:lnSpc>
+                <a:spcPct val="130000"/>
+              </a:lnSpc>
+            </a:pPr>
+            <a:r>
+              <a:rPr lang="en-US" sz="2000" b="1">
+                <a:solidFill>
+                  <a:schemeClr val="tx2"/>
+                </a:solidFill>
+              </a:rPr>
+              <a:t>1)  </a:t>
+            </a:r>
+            <a:r>
+              <a:rPr lang="en-US" sz="2000" b="1">
+                <a:solidFill>
+                  <a:schemeClr val="tx2"/>
+                </a:solidFill>
+                <a:effectLst>
+                  <a:outerShdw blurRad="38100" dist="38100" dir="2700000" algn="tl">
+                    <a:srgbClr val="000000"/>
+                  </a:outerShdw>
+                </a:effectLst>
+              </a:rPr>
+              <a:t>it decreases</a:t>
+            </a:r>
+            <a:r>
+              <a:rPr lang="en-US" sz="2000" b="1">
+                <a:solidFill>
+                  <a:schemeClr val="tx2"/>
+                </a:solidFill>
+              </a:rPr>
+              <a:t> </a:t>
+            </a:r>
+            <a:r>
+              <a:rPr lang="en-US" sz="2000" b="1">
+                <a:solidFill>
+                  <a:schemeClr val="tx2"/>
+                </a:solidFill>
+                <a:effectLst>
+                  <a:outerShdw blurRad="38100" dist="38100" dir="2700000" algn="tl">
+                    <a:srgbClr val="000000"/>
+                  </a:outerShdw>
+                </a:effectLst>
+              </a:rPr>
+              <a:t>by a factor 4</a:t>
+            </a:r>
+            <a:endParaRPr lang="en-US" sz="2000" b="1">
+              <a:solidFill>
+                <a:schemeClr val="tx2"/>
+              </a:solidFill>
+            </a:endParaRPr>
+          </a:p>
+          <a:p>
+            <a:pPr>
+              <a:lnSpc>
+                <a:spcPct val="130000"/>
+              </a:lnSpc>
+            </a:pPr>
+            <a:r>
+              <a:rPr lang="en-US" sz="2000" b="1">
+                <a:solidFill>
+                  <a:schemeClr val="tx2"/>
+                </a:solidFill>
+              </a:rPr>
+              <a:t>2)  </a:t>
+            </a:r>
+            <a:r>
+              <a:rPr lang="en-US" sz="2000" b="1">
+                <a:solidFill>
+                  <a:schemeClr val="tx2"/>
+                </a:solidFill>
+                <a:effectLst>
+                  <a:outerShdw blurRad="38100" dist="38100" dir="2700000" algn="tl">
+                    <a:srgbClr val="000000"/>
+                  </a:outerShdw>
+                </a:effectLst>
+              </a:rPr>
+              <a:t>it decreases</a:t>
+            </a:r>
+            <a:r>
+              <a:rPr lang="en-US" sz="2000" b="1">
+                <a:solidFill>
+                  <a:schemeClr val="tx2"/>
+                </a:solidFill>
+              </a:rPr>
+              <a:t> </a:t>
+            </a:r>
+            <a:r>
+              <a:rPr lang="en-US" sz="2000" b="1">
+                <a:solidFill>
+                  <a:schemeClr val="tx2"/>
+                </a:solidFill>
+                <a:effectLst>
+                  <a:outerShdw blurRad="38100" dist="38100" dir="2700000" algn="tl">
+                    <a:srgbClr val="000000"/>
+                  </a:outerShdw>
+                </a:effectLst>
+              </a:rPr>
+              <a:t>by a factor 2</a:t>
+            </a:r>
+            <a:endParaRPr lang="en-US" sz="2000" b="1">
+              <a:solidFill>
+                <a:schemeClr val="tx2"/>
+              </a:solidFill>
+            </a:endParaRPr>
+          </a:p>
+          <a:p>
+            <a:pPr>
+              <a:lnSpc>
+                <a:spcPct val="130000"/>
+              </a:lnSpc>
+            </a:pPr>
+            <a:r>
+              <a:rPr lang="en-US" sz="2000" b="1">
+                <a:solidFill>
+                  <a:schemeClr val="tx2"/>
+                </a:solidFill>
+              </a:rPr>
+              <a:t>3)  </a:t>
+            </a:r>
+            <a:r>
+              <a:rPr lang="en-US" sz="2000" b="1">
+                <a:solidFill>
+                  <a:schemeClr val="tx2"/>
+                </a:solidFill>
+                <a:effectLst>
+                  <a:outerShdw blurRad="38100" dist="38100" dir="2700000" algn="tl">
+                    <a:srgbClr val="000000"/>
+                  </a:outerShdw>
+                </a:effectLst>
+              </a:rPr>
+              <a:t>it stays the same</a:t>
+            </a:r>
+          </a:p>
+          <a:p>
+            <a:pPr>
+              <a:lnSpc>
+                <a:spcPct val="130000"/>
+              </a:lnSpc>
+            </a:pPr>
+            <a:r>
+              <a:rPr lang="en-US" sz="2000" b="1">
+                <a:solidFill>
+                  <a:schemeClr val="tx2"/>
+                </a:solidFill>
+                <a:effectLst>
+                  <a:outerShdw blurRad="38100" dist="38100" dir="2700000" algn="tl">
+                    <a:srgbClr val="000000"/>
+                  </a:outerShdw>
+                </a:effectLst>
+              </a:rPr>
+              <a:t>4)  it increases</a:t>
+            </a:r>
+            <a:r>
+              <a:rPr lang="en-US" sz="2000" b="1">
+                <a:solidFill>
+                  <a:schemeClr val="tx2"/>
+                </a:solidFill>
+              </a:rPr>
+              <a:t> </a:t>
+            </a:r>
+            <a:r>
+              <a:rPr lang="en-US" sz="2000" b="1">
+                <a:solidFill>
+                  <a:schemeClr val="tx2"/>
+                </a:solidFill>
+                <a:effectLst>
+                  <a:outerShdw blurRad="38100" dist="38100" dir="2700000" algn="tl">
+                    <a:srgbClr val="000000"/>
+                  </a:outerShdw>
+                </a:effectLst>
+              </a:rPr>
+              <a:t>by a factor 2</a:t>
+            </a:r>
+          </a:p>
+          <a:p>
+            <a:pPr>
+              <a:lnSpc>
+                <a:spcPct val="130000"/>
+              </a:lnSpc>
+            </a:pPr>
+            <a:r>
+              <a:rPr lang="en-US" sz="2000" b="1">
+                <a:solidFill>
+                  <a:schemeClr val="tx2"/>
+                </a:solidFill>
+                <a:effectLst>
+                  <a:outerShdw blurRad="38100" dist="38100" dir="2700000" algn="tl">
+                    <a:srgbClr val="000000"/>
+                  </a:outerShdw>
+                </a:effectLst>
+              </a:rPr>
+              <a:t>5)  it increases</a:t>
+            </a:r>
+            <a:r>
+              <a:rPr lang="en-US" sz="2000" b="1">
+                <a:solidFill>
+                  <a:schemeClr val="tx2"/>
+                </a:solidFill>
+              </a:rPr>
+              <a:t> </a:t>
+            </a:r>
+            <a:r>
+              <a:rPr lang="en-US" sz="2000" b="1">
+                <a:solidFill>
+                  <a:schemeClr val="tx2"/>
+                </a:solidFill>
+                <a:effectLst>
+                  <a:outerShdw blurRad="38100" dist="38100" dir="2700000" algn="tl">
+                    <a:srgbClr val="000000"/>
+                  </a:outerShdw>
+                </a:effectLst>
+              </a:rPr>
+              <a:t>by a factor 4</a:t>
+            </a:r>
+            <a:endParaRPr lang="en-US" b="1">
+              <a:solidFill>
+                <a:schemeClr val="tx2"/>
+              </a:solidFill>
+            </a:endParaRPr>
+          </a:p>
+        </p:txBody>
+      </p:sp>
+    </p:spTree>
+  </p:cSld>
+  <p:clrMapOvr>
+    <a:masterClrMapping/>
+  </p:clrMapOvr>
+</p:sld>
+</file>
+
+<file path=ppt/slides/slide31.xml><?xml version="1.0" encoding="utf-8"?>
 <p:sld xmlns:a="http://schemas.openxmlformats.org/drawingml/2006/main" xmlns:r="http://schemas.openxmlformats.org/officeDocument/2006/relationships" xmlns:p="http://schemas.openxmlformats.org/presentationml/2006/main">
   <p:cSld>
     <p:spTree>
@@ -21128,262 +21256,6 @@
 </p:sld>
 </file>
 
-<file path=ppt/slides/slide31.xml><?xml version="1.0" encoding="utf-8"?>
-<p:sld xmlns:a="http://schemas.openxmlformats.org/drawingml/2006/main" xmlns:r="http://schemas.openxmlformats.org/officeDocument/2006/relationships" xmlns:p="http://schemas.openxmlformats.org/presentationml/2006/main">
-  <p:cSld>
-    <p:spTree>
-      <p:nvGrpSpPr>
-        <p:cNvPr id="1" name=""/>
-        <p:cNvGrpSpPr/>
-        <p:nvPr/>
-      </p:nvGrpSpPr>
-      <p:grpSpPr>
-        <a:xfrm>
-          <a:off x="0" y="0"/>
-          <a:ext cx="0" cy="0"/>
-          <a:chOff x="0" y="0"/>
-          <a:chExt cx="0" cy="0"/>
-        </a:xfrm>
-      </p:grpSpPr>
-      <p:sp>
-        <p:nvSpPr>
-          <p:cNvPr id="1656837" name="Rectangle 5"/>
-          <p:cNvSpPr>
-            <a:spLocks noChangeArrowheads="1"/>
-          </p:cNvSpPr>
-          <p:nvPr/>
-        </p:nvSpPr>
-        <p:spPr bwMode="auto">
-          <a:xfrm>
-            <a:off x="660400" y="0"/>
-            <a:ext cx="8050213" cy="838200"/>
-          </a:xfrm>
-          <a:prstGeom prst="rect">
-            <a:avLst/>
-          </a:prstGeom>
-          <a:noFill/>
-          <a:ln w="9525">
-            <a:noFill/>
-            <a:miter lim="800000"/>
-            <a:headEnd/>
-            <a:tailEnd/>
-          </a:ln>
-          <a:effectLst/>
-        </p:spPr>
-        <p:txBody>
-          <a:bodyPr lIns="90488" tIns="44450" rIns="90488" bIns="44450" anchor="ctr"/>
-          <a:lstStyle/>
-          <a:p>
-            <a:pPr algn="ctr">
-              <a:lnSpc>
-                <a:spcPct val="90000"/>
-              </a:lnSpc>
-            </a:pPr>
-            <a:r>
-              <a:rPr lang="en-US" sz="2800" b="1" i="1">
-                <a:solidFill>
-                  <a:schemeClr val="tx2"/>
-                </a:solidFill>
-                <a:effectLst>
-                  <a:outerShdw blurRad="38100" dist="38100" dir="2700000" algn="tl">
-                    <a:srgbClr val="000000"/>
-                  </a:outerShdw>
-                </a:effectLst>
-              </a:rPr>
-              <a:t>Concept Question 17.1	Temperature</a:t>
-            </a:r>
-            <a:r>
-              <a:rPr lang="en-US" sz="2800" b="1">
-                <a:solidFill>
-                  <a:schemeClr val="accent2"/>
-                </a:solidFill>
-                <a:effectLst>
-                  <a:outerShdw blurRad="38100" dist="38100" dir="2700000" algn="tl">
-                    <a:srgbClr val="000000"/>
-                  </a:outerShdw>
-                </a:effectLst>
-              </a:rPr>
-              <a:t> </a:t>
-            </a:r>
-          </a:p>
-        </p:txBody>
-      </p:sp>
-      <p:sp>
-        <p:nvSpPr>
-          <p:cNvPr id="1656838" name="Rectangle 6"/>
-          <p:cNvSpPr>
-            <a:spLocks noChangeArrowheads="1"/>
-          </p:cNvSpPr>
-          <p:nvPr/>
-        </p:nvSpPr>
-        <p:spPr bwMode="auto">
-          <a:xfrm>
-            <a:off x="0" y="906463"/>
-            <a:ext cx="4691063" cy="2395537"/>
-          </a:xfrm>
-          <a:prstGeom prst="rect">
-            <a:avLst/>
-          </a:prstGeom>
-          <a:noFill/>
-          <a:ln w="9525">
-            <a:noFill/>
-            <a:miter lim="800000"/>
-            <a:headEnd/>
-            <a:tailEnd/>
-          </a:ln>
-          <a:effectLst/>
-        </p:spPr>
-        <p:txBody>
-          <a:bodyPr lIns="90488" tIns="44450" rIns="90488" bIns="44450"/>
-          <a:lstStyle/>
-          <a:p>
-            <a:pPr marL="401638" indent="-401638">
-              <a:lnSpc>
-                <a:spcPct val="130000"/>
-              </a:lnSpc>
-              <a:spcBef>
-                <a:spcPct val="50000"/>
-              </a:spcBef>
-              <a:buClr>
-                <a:schemeClr val="bg2"/>
-              </a:buClr>
-              <a:buSzPct val="75000"/>
-              <a:buFont typeface="Monotype Sorts" pitchFamily="2" charset="2"/>
-              <a:buNone/>
-            </a:pPr>
-            <a:r>
-              <a:rPr lang="en-US" sz="2000" b="1">
-                <a:effectLst>
-                  <a:outerShdw blurRad="38100" dist="38100" dir="2700000" algn="tl">
-                    <a:srgbClr val="000000"/>
-                  </a:outerShdw>
-                </a:effectLst>
-              </a:rPr>
-              <a:t>	You are listening to your Ipod on a hot summer day at the beach in the Bahamas. Is the resistance of the wires in the Ipod the same as it would be if you were in Siberia at the beach?</a:t>
-            </a:r>
-            <a:endParaRPr lang="en-US" sz="2200" b="1">
-              <a:effectLst>
-                <a:outerShdw blurRad="38100" dist="38100" dir="2700000" algn="tl">
-                  <a:srgbClr val="000000"/>
-                </a:outerShdw>
-              </a:effectLst>
-            </a:endParaRPr>
-          </a:p>
-        </p:txBody>
-      </p:sp>
-      <p:sp>
-        <p:nvSpPr>
-          <p:cNvPr id="1656839" name="Text Box 7"/>
-          <p:cNvSpPr txBox="1">
-            <a:spLocks noChangeArrowheads="1"/>
-          </p:cNvSpPr>
-          <p:nvPr/>
-        </p:nvSpPr>
-        <p:spPr bwMode="auto">
-          <a:xfrm>
-            <a:off x="4902200" y="838200"/>
-            <a:ext cx="4241800" cy="2870200"/>
-          </a:xfrm>
-          <a:prstGeom prst="rect">
-            <a:avLst/>
-          </a:prstGeom>
-          <a:noFill/>
-          <a:ln w="9525">
-            <a:noFill/>
-            <a:miter lim="800000"/>
-            <a:headEnd/>
-            <a:tailEnd/>
-          </a:ln>
-          <a:effectLst/>
-        </p:spPr>
-        <p:txBody>
-          <a:bodyPr>
-            <a:spAutoFit/>
-          </a:bodyPr>
-          <a:lstStyle/>
-          <a:p>
-            <a:pPr marL="457200" indent="-457200">
-              <a:lnSpc>
-                <a:spcPct val="130000"/>
-              </a:lnSpc>
-              <a:buFontTx/>
-              <a:buAutoNum type="alphaLcParenR"/>
-            </a:pPr>
-            <a:r>
-              <a:rPr lang="en-US" sz="2000" b="1">
-                <a:solidFill>
-                  <a:schemeClr val="tx2"/>
-                </a:solidFill>
-              </a:rPr>
-              <a:t>The resistance is larger in Siberia</a:t>
-            </a:r>
-          </a:p>
-          <a:p>
-            <a:pPr marL="457200" indent="-457200">
-              <a:lnSpc>
-                <a:spcPct val="130000"/>
-              </a:lnSpc>
-              <a:buFontTx/>
-              <a:buAutoNum type="alphaLcParenR"/>
-            </a:pPr>
-            <a:r>
-              <a:rPr lang="en-US" sz="2000" b="1">
-                <a:solidFill>
-                  <a:schemeClr val="tx2"/>
-                </a:solidFill>
-              </a:rPr>
-              <a:t>It is larger in the Bahamas</a:t>
-            </a:r>
-          </a:p>
-          <a:p>
-            <a:pPr marL="457200" indent="-457200">
-              <a:lnSpc>
-                <a:spcPct val="130000"/>
-              </a:lnSpc>
-              <a:buFontTx/>
-              <a:buAutoNum type="alphaLcParenR"/>
-            </a:pPr>
-            <a:r>
-              <a:rPr lang="en-US" sz="2000" b="1">
-                <a:solidFill>
-                  <a:schemeClr val="tx2"/>
-                </a:solidFill>
-              </a:rPr>
-              <a:t>It is the same-it does not depend on where you are!</a:t>
-            </a:r>
-          </a:p>
-          <a:p>
-            <a:pPr marL="457200" indent="-457200">
-              <a:lnSpc>
-                <a:spcPct val="130000"/>
-              </a:lnSpc>
-              <a:buFontTx/>
-              <a:buAutoNum type="alphaLcParenR"/>
-            </a:pPr>
-            <a:r>
-              <a:rPr lang="en-US" sz="2000" b="1">
-                <a:solidFill>
-                  <a:schemeClr val="tx2"/>
-                </a:solidFill>
-              </a:rPr>
-              <a:t>It depends on which Ipod you buy.</a:t>
-            </a:r>
-            <a:endParaRPr lang="en-US" b="1">
-              <a:solidFill>
-                <a:schemeClr val="tx2"/>
-              </a:solidFill>
-            </a:endParaRPr>
-          </a:p>
-        </p:txBody>
-      </p:sp>
-    </p:spTree>
-  </p:cSld>
-  <p:clrMapOvr>
-    <a:masterClrMapping/>
-  </p:clrMapOvr>
-</p:sld>
-</file>
-
 <file path=ppt/slides/slide32.xml><?xml version="1.0" encoding="utf-8"?>
 <p:sld xmlns:a="http://schemas.openxmlformats.org/drawingml/2006/main" xmlns:r="http://schemas.openxmlformats.org/officeDocument/2006/relationships" xmlns:p="http://schemas.openxmlformats.org/presentationml/2006/main">
   <p:cSld>
@@ -21403,105 +21275,7 @@
       </p:grpSpPr>
       <p:sp>
         <p:nvSpPr>
-          <p:cNvPr id="1570819" name="Rectangle 3"/>
-          <p:cNvSpPr>
-            <a:spLocks noGrp="1" noChangeArrowheads="1"/>
-          </p:cNvSpPr>
-          <p:nvPr>
-            <p:ph type="title"/>
-          </p:nvPr>
-        </p:nvSpPr>
-        <p:spPr>
-          <a:xfrm>
-            <a:off x="660400" y="0"/>
-            <a:ext cx="8050213" cy="838200"/>
-          </a:xfrm>
-          <a:noFill/>
-          <a:ln/>
-        </p:spPr>
-        <p:txBody>
-          <a:bodyPr/>
-          <a:lstStyle/>
-          <a:p>
-            <a:pPr>
-              <a:lnSpc>
-                <a:spcPct val="90000"/>
-              </a:lnSpc>
-            </a:pPr>
-            <a:r>
-              <a:rPr lang="en-US" sz="2800" i="1"/>
-              <a:t>ConcepTest 18.4</a:t>
-            </a:r>
-            <a:r>
-              <a:rPr lang="en-US" sz="2800" i="1">
-                <a:solidFill>
-                  <a:srgbClr val="000000"/>
-                </a:solidFill>
-                <a:effectLst/>
-              </a:rPr>
-              <a:t>	</a:t>
-            </a:r>
-            <a:r>
-              <a:rPr lang="en-US" sz="2800">
-                <a:solidFill>
-                  <a:schemeClr val="accent2"/>
-                </a:solidFill>
-              </a:rPr>
-              <a:t>Dimmer </a:t>
-            </a:r>
-          </a:p>
-        </p:txBody>
-      </p:sp>
-      <p:sp>
-        <p:nvSpPr>
-          <p:cNvPr id="1570820" name="Rectangle 4"/>
-          <p:cNvSpPr>
-            <a:spLocks noGrp="1" noChangeArrowheads="1"/>
-          </p:cNvSpPr>
-          <p:nvPr>
-            <p:ph idx="1"/>
-          </p:nvPr>
-        </p:nvSpPr>
-        <p:spPr>
-          <a:xfrm>
-            <a:off x="192088" y="1225550"/>
-            <a:ext cx="4546600" cy="1600200"/>
-          </a:xfrm>
-          <a:noFill/>
-          <a:ln/>
-        </p:spPr>
-        <p:txBody>
-          <a:bodyPr>
-            <a:normAutofit fontScale="70000" lnSpcReduction="20000"/>
-          </a:bodyPr>
-          <a:lstStyle/>
-          <a:p>
-            <a:pPr marL="401638" indent="-401638">
-              <a:lnSpc>
-                <a:spcPct val="150000"/>
-              </a:lnSpc>
-              <a:spcBef>
-                <a:spcPct val="50000"/>
-              </a:spcBef>
-              <a:buFont typeface="Monotype Sorts" pitchFamily="2" charset="2"/>
-              <a:buNone/>
-            </a:pPr>
-            <a:r>
-              <a:rPr lang="en-US" b="1">
-                <a:effectLst>
-                  <a:outerShdw blurRad="38100" dist="38100" dir="2700000" algn="tl">
-                    <a:srgbClr val="000000"/>
-                  </a:outerShdw>
-                </a:effectLst>
-              </a:rPr>
-              <a:t>	When you rotate the knob of a light dimmer, what is being changed in the electric circuit?</a:t>
-            </a:r>
-          </a:p>
-        </p:txBody>
-      </p:sp>
-      <p:sp>
-        <p:nvSpPr>
-          <p:cNvPr id="1570821" name="Rectangle 5"/>
+          <p:cNvPr id="1656837" name="Rectangle 5"/>
           <p:cNvSpPr>
             <a:spLocks noChangeArrowheads="1"/>
           </p:cNvSpPr>
@@ -21509,8 +21283,8 @@
         </p:nvSpPr>
         <p:spPr bwMode="auto">
           <a:xfrm>
-            <a:off x="5130800" y="865188"/>
-            <a:ext cx="3627438" cy="2376487"/>
+            <a:off x="660400" y="0"/>
+            <a:ext cx="8050213" cy="838200"/>
           </a:xfrm>
           <a:prstGeom prst="rect">
             <a:avLst/>
@@ -21525,29 +21299,16 @@
           <a:effectLst/>
         </p:spPr>
         <p:txBody>
-          <a:bodyPr lIns="92075" tIns="46038" rIns="92075" bIns="46038">
-            <a:spAutoFit/>
-          </a:bodyPr>
-          <a:lstStyle/>
-          <a:p>
-            <a:pPr marL="285750" indent="-285750">
+          <a:bodyPr lIns="90488" tIns="44450" rIns="90488" bIns="44450" anchor="ctr"/>
+          <a:lstStyle/>
+          <a:p>
+            <a:pPr algn="ctr">
               <a:lnSpc>
-                <a:spcPct val="110000"/>
+                <a:spcPct val="90000"/>
               </a:lnSpc>
-              <a:spcBef>
-                <a:spcPct val="50000"/>
-              </a:spcBef>
             </a:pPr>
             <a:r>
-              <a:rPr lang="en-US" sz="2000" b="1">
-                <a:solidFill>
-                  <a:schemeClr val="tx2"/>
-                </a:solidFill>
-              </a:rPr>
-              <a:t>1)</a:t>
-            </a:r>
-            <a:r>
-              <a:rPr lang="en-US" sz="2000" b="1">
+              <a:rPr lang="en-US" sz="2800" b="1" i="1">
                 <a:solidFill>
                   <a:schemeClr val="tx2"/>
                 </a:solidFill>
@@ -21557,20 +21318,78 @@
                   </a:outerShdw>
                 </a:effectLst>
               </a:rPr>
-              <a:t>   </a:t>
-            </a:r>
+              <a:t>Concept Question 17.1	Temperature</a:t>
+            </a:r>
+            <a:r>
+              <a:rPr lang="en-US" sz="2800" b="1">
+                <a:solidFill>
+                  <a:schemeClr val="accent2"/>
+                </a:solidFill>
+                <a:effectLst>
+                  <a:outerShdw blurRad="38100" dist="38100" dir="2700000" algn="tl">
+                    <a:srgbClr val="000000"/>
+                  </a:outerShdw>
+                </a:effectLst>
+              </a:rPr>
+              <a:t> </a:t>
+            </a:r>
+          </a:p>
+        </p:txBody>
+      </p:sp>
+      <p:sp>
+        <p:nvSpPr>
+          <p:cNvPr id="1656838" name="Rectangle 6"/>
+          <p:cNvSpPr>
+            <a:spLocks noChangeArrowheads="1"/>
+          </p:cNvSpPr>
+          <p:nvPr/>
+        </p:nvSpPr>
+        <p:spPr bwMode="auto">
+          <a:xfrm>
+            <a:off x="0" y="906463"/>
+            <a:ext cx="4691063" cy="2395537"/>
+          </a:xfrm>
+          <a:prstGeom prst="rect">
+            <a:avLst/>
+          </a:prstGeom>
+          <a:noFill/>
+          <a:ln w="9525">
+            <a:noFill/>
+            <a:miter lim="800000"/>
+            <a:headEnd/>
+            <a:tailEnd/>
+          </a:ln>
+          <a:effectLst/>
+        </p:spPr>
+        <p:txBody>
+          <a:bodyPr lIns="90488" tIns="44450" rIns="90488" bIns="44450"/>
+          <a:lstStyle/>
+          <a:p>
+            <a:pPr marL="401638" indent="-401638">
+              <a:lnSpc>
+                <a:spcPct val="130000"/>
+              </a:lnSpc>
+              <a:spcBef>
+                <a:spcPct val="50000"/>
+              </a:spcBef>
+              <a:buClr>
+                <a:schemeClr val="bg2"/>
+              </a:buClr>
+              <a:buSzPct val="75000"/>
+              <a:buFont typeface="Monotype Sorts" pitchFamily="2" charset="2"/>
+              <a:buNone/>
+            </a:pPr>
             <a:r>
               <a:rPr lang="en-US" sz="2000" b="1">
-                <a:solidFill>
-                  <a:schemeClr val="tx2"/>
-                </a:solidFill>
-              </a:rPr>
-              <a:t>the power</a:t>
-            </a:r>
-            <a:endParaRPr lang="en-US" sz="2000" b="1">
-              <a:solidFill>
-                <a:schemeClr val="tx2"/>
-              </a:solidFill>
+                <a:effectLst>
+                  <a:outerShdw blurRad="38100" dist="38100" dir="2700000" algn="tl">
+                    <a:srgbClr val="000000"/>
+                  </a:outerShdw>
+                </a:effectLst>
+              </a:rPr>
+              <a:t>	You are listening to your Ipod on a hot summer day at the beach in the Bahamas. Is the resistance of the wires in the Ipod the same as it would be if you were in Siberia at the beach?</a:t>
+            </a:r>
+            <a:endParaRPr lang="en-US" sz="2200" b="1">
               <a:effectLst>
                 <a:outerShdw blurRad="38100" dist="38100" dir="2700000" algn="tl">
                   <a:srgbClr val="000000"/>
@@ -21578,14 +21397,45 @@
               </a:effectLst>
             </a:endParaRPr>
           </a:p>
-          <a:p>
-            <a:pPr marL="285750" indent="-285750">
+        </p:txBody>
+      </p:sp>
+      <p:sp>
+        <p:nvSpPr>
+          <p:cNvPr id="1656839" name="Text Box 7"/>
+          <p:cNvSpPr txBox="1">
+            <a:spLocks noChangeArrowheads="1"/>
+          </p:cNvSpPr>
+          <p:nvPr/>
+        </p:nvSpPr>
+        <p:spPr bwMode="auto">
+          <a:xfrm>
+            <a:off x="4902200" y="838200"/>
+            <a:ext cx="4241800" cy="2870200"/>
+          </a:xfrm>
+          <a:prstGeom prst="rect">
+            <a:avLst/>
+          </a:prstGeom>
+          <a:noFill/>
+          <a:ln w="9525">
+            <a:noFill/>
+            <a:miter lim="800000"/>
+            <a:headEnd/>
+            <a:tailEnd/>
+          </a:ln>
+          <a:effectLst/>
+        </p:spPr>
+        <p:txBody>
+          <a:bodyPr>
+            <a:spAutoFit/>
+          </a:bodyPr>
+          <a:lstStyle/>
+          <a:p>
+            <a:pPr marL="457200" indent="-457200">
               <a:lnSpc>
-                <a:spcPct val="110000"/>
+                <a:spcPct val="130000"/>
               </a:lnSpc>
-              <a:spcBef>
-                <a:spcPct val="50000"/>
-              </a:spcBef>
+              <a:buFontTx/>
+              <a:buAutoNum type="alphaLcParenR"/>
             </a:pPr>
             <a:r>
               <a:rPr lang="en-US" sz="2000" b="1">
@@ -21593,114 +21443,64 @@
                   <a:schemeClr val="tx2"/>
                 </a:solidFill>
               </a:rPr>
-              <a:t>2)</a:t>
-            </a:r>
+              <a:t>The resistance is larger in Siberia</a:t>
+            </a:r>
+          </a:p>
+          <a:p>
+            <a:pPr marL="457200" indent="-457200">
+              <a:lnSpc>
+                <a:spcPct val="130000"/>
+              </a:lnSpc>
+              <a:buFontTx/>
+              <a:buAutoNum type="alphaLcParenR"/>
+            </a:pPr>
             <a:r>
               <a:rPr lang="en-US" sz="2000" b="1">
                 <a:solidFill>
                   <a:schemeClr val="tx2"/>
                 </a:solidFill>
-                <a:effectLst>
-                  <a:outerShdw blurRad="38100" dist="38100" dir="2700000" algn="tl">
-                    <a:srgbClr val="000000"/>
-                  </a:outerShdw>
-                </a:effectLst>
-              </a:rPr>
-              <a:t>   </a:t>
-            </a:r>
+              </a:rPr>
+              <a:t>It is larger in the Bahamas</a:t>
+            </a:r>
+          </a:p>
+          <a:p>
+            <a:pPr marL="457200" indent="-457200">
+              <a:lnSpc>
+                <a:spcPct val="130000"/>
+              </a:lnSpc>
+              <a:buFontTx/>
+              <a:buAutoNum type="alphaLcParenR"/>
+            </a:pPr>
             <a:r>
               <a:rPr lang="en-US" sz="2000" b="1">
                 <a:solidFill>
                   <a:schemeClr val="tx2"/>
                 </a:solidFill>
               </a:rPr>
-              <a:t>the current</a:t>
-            </a:r>
-            <a:endParaRPr lang="en-US" sz="2000" b="1">
+              <a:t>It is the same-it does not depend on where you are!</a:t>
+            </a:r>
+          </a:p>
+          <a:p>
+            <a:pPr marL="457200" indent="-457200">
+              <a:lnSpc>
+                <a:spcPct val="130000"/>
+              </a:lnSpc>
+              <a:buFontTx/>
+              <a:buAutoNum type="alphaLcParenR"/>
+            </a:pPr>
+            <a:r>
+              <a:rPr lang="en-US" sz="2000" b="1">
+                <a:solidFill>
+                  <a:schemeClr val="tx2"/>
+                </a:solidFill>
+              </a:rPr>
+              <a:t>It depends on which Ipod you buy.</a:t>
+            </a:r>
+            <a:endParaRPr lang="en-US" b="1">
               <a:solidFill>
                 <a:schemeClr val="tx2"/>
               </a:solidFill>
-              <a:effectLst>
-                <a:outerShdw blurRad="38100" dist="38100" dir="2700000" algn="tl">
-                  <a:srgbClr val="000000"/>
-                </a:outerShdw>
-              </a:effectLst>
             </a:endParaRPr>
-          </a:p>
-          <a:p>
-            <a:pPr marL="285750" indent="-285750">
-              <a:lnSpc>
-                <a:spcPct val="110000"/>
-              </a:lnSpc>
-              <a:spcBef>
-                <a:spcPct val="50000"/>
-              </a:spcBef>
-            </a:pPr>
-            <a:r>
-              <a:rPr lang="en-US" sz="2000" b="1">
-                <a:solidFill>
-                  <a:schemeClr val="tx2"/>
-                </a:solidFill>
-              </a:rPr>
-              <a:t>3)</a:t>
-            </a:r>
-            <a:r>
-              <a:rPr lang="en-US" sz="2000" b="1">
-                <a:solidFill>
-                  <a:schemeClr val="tx2"/>
-                </a:solidFill>
-                <a:effectLst>
-                  <a:outerShdw blurRad="38100" dist="38100" dir="2700000" algn="tl">
-                    <a:srgbClr val="000000"/>
-                  </a:outerShdw>
-                </a:effectLst>
-              </a:rPr>
-              <a:t>   </a:t>
-            </a:r>
-            <a:r>
-              <a:rPr lang="en-US" sz="2000" b="1">
-                <a:solidFill>
-                  <a:schemeClr val="tx2"/>
-                </a:solidFill>
-              </a:rPr>
-              <a:t>the voltage</a:t>
-            </a:r>
-          </a:p>
-          <a:p>
-            <a:pPr marL="285750" indent="-285750">
-              <a:lnSpc>
-                <a:spcPct val="110000"/>
-              </a:lnSpc>
-              <a:spcBef>
-                <a:spcPct val="50000"/>
-              </a:spcBef>
-            </a:pPr>
-            <a:r>
-              <a:rPr lang="en-US" sz="2000" b="1">
-                <a:solidFill>
-                  <a:schemeClr val="tx2"/>
-                </a:solidFill>
-              </a:rPr>
-              <a:t>4)   both (1) and (2)</a:t>
-            </a:r>
-          </a:p>
-          <a:p>
-            <a:pPr marL="285750" indent="-285750">
-              <a:lnSpc>
-                <a:spcPct val="110000"/>
-              </a:lnSpc>
-              <a:spcBef>
-                <a:spcPct val="50000"/>
-              </a:spcBef>
-            </a:pPr>
-            <a:r>
-              <a:rPr lang="en-US" sz="2000" b="1">
-                <a:solidFill>
-                  <a:schemeClr val="tx2"/>
-                </a:solidFill>
-              </a:rPr>
-              <a:t>5)   both (2) and (3)</a:t>
-            </a:r>
           </a:p>
         </p:txBody>
       </p:sp>
@@ -21731,7 +21531,105 @@
       </p:grpSpPr>
       <p:sp>
         <p:nvSpPr>
-          <p:cNvPr id="1572866" name="AutoShape 2"/>
+          <p:cNvPr id="1570819" name="Rectangle 3"/>
+          <p:cNvSpPr>
+            <a:spLocks noGrp="1" noChangeArrowheads="1"/>
+          </p:cNvSpPr>
+          <p:nvPr>
+            <p:ph type="title"/>
+          </p:nvPr>
+        </p:nvSpPr>
+        <p:spPr>
+          <a:xfrm>
+            <a:off x="660400" y="0"/>
+            <a:ext cx="8050213" cy="838200"/>
+          </a:xfrm>
+          <a:noFill/>
+          <a:ln/>
+        </p:spPr>
+        <p:txBody>
+          <a:bodyPr/>
+          <a:lstStyle/>
+          <a:p>
+            <a:pPr>
+              <a:lnSpc>
+                <a:spcPct val="90000"/>
+              </a:lnSpc>
+            </a:pPr>
+            <a:r>
+              <a:rPr lang="en-US" sz="2800" i="1"/>
+              <a:t>ConcepTest 18.4</a:t>
+            </a:r>
+            <a:r>
+              <a:rPr lang="en-US" sz="2800" i="1">
+                <a:solidFill>
+                  <a:srgbClr val="000000"/>
+                </a:solidFill>
+                <a:effectLst/>
+              </a:rPr>
+              <a:t>	</a:t>
+            </a:r>
+            <a:r>
+              <a:rPr lang="en-US" sz="2800">
+                <a:solidFill>
+                  <a:schemeClr val="accent2"/>
+                </a:solidFill>
+              </a:rPr>
+              <a:t>Dimmer </a:t>
+            </a:r>
+          </a:p>
+        </p:txBody>
+      </p:sp>
+      <p:sp>
+        <p:nvSpPr>
+          <p:cNvPr id="1570820" name="Rectangle 4"/>
+          <p:cNvSpPr>
+            <a:spLocks noGrp="1" noChangeArrowheads="1"/>
+          </p:cNvSpPr>
+          <p:nvPr>
+            <p:ph idx="1"/>
+          </p:nvPr>
+        </p:nvSpPr>
+        <p:spPr>
+          <a:xfrm>
+            <a:off x="192088" y="1225550"/>
+            <a:ext cx="4546600" cy="1600200"/>
+          </a:xfrm>
+          <a:noFill/>
+          <a:ln/>
+        </p:spPr>
+        <p:txBody>
+          <a:bodyPr>
+            <a:normAutofit fontScale="70000" lnSpcReduction="20000"/>
+          </a:bodyPr>
+          <a:lstStyle/>
+          <a:p>
+            <a:pPr marL="401638" indent="-401638">
+              <a:lnSpc>
+                <a:spcPct val="150000"/>
+              </a:lnSpc>
+              <a:spcBef>
+                <a:spcPct val="50000"/>
+              </a:spcBef>
+              <a:buFont typeface="Monotype Sorts" pitchFamily="2" charset="2"/>
+              <a:buNone/>
+            </a:pPr>
+            <a:r>
+              <a:rPr lang="en-US" b="1">
+                <a:effectLst>
+                  <a:outerShdw blurRad="38100" dist="38100" dir="2700000" algn="tl">
+                    <a:srgbClr val="000000"/>
+                  </a:outerShdw>
+                </a:effectLst>
+              </a:rPr>
+              <a:t>	When you rotate the knob of a light dimmer, what is being changed in the electric circuit?</a:t>
+            </a:r>
+          </a:p>
+        </p:txBody>
+      </p:sp>
+      <p:sp>
+        <p:nvSpPr>
+          <p:cNvPr id="1570821" name="Rectangle 5"/>
           <p:cNvSpPr>
             <a:spLocks noChangeArrowheads="1"/>
           </p:cNvSpPr>
@@ -21739,50 +21637,8 @@
         </p:nvSpPr>
         <p:spPr bwMode="auto">
           <a:xfrm>
-            <a:off x="1565275" y="3568700"/>
-            <a:ext cx="6205538" cy="2062163"/>
-          </a:xfrm>
-          <a:prstGeom prst="roundRect">
-            <a:avLst>
-              <a:gd name="adj" fmla="val 16667"/>
-            </a:avLst>
-          </a:prstGeom>
-          <a:solidFill>
-            <a:schemeClr val="accent1"/>
-          </a:solidFill>
-          <a:ln w="38100">
-            <a:solidFill>
-              <a:srgbClr val="000000"/>
-            </a:solidFill>
-            <a:round/>
-            <a:headEnd type="none" w="sm" len="sm"/>
-            <a:tailEnd type="none" w="sm" len="sm"/>
-          </a:ln>
-          <a:effectLst/>
-        </p:spPr>
-        <p:txBody>
-          <a:bodyPr wrap="none" anchor="ctr"/>
-          <a:lstStyle/>
-          <a:p>
-            <a:pPr algn="ctr"/>
-            <a:endParaRPr lang="en-US">
-              <a:latin typeface="Times New Roman" pitchFamily="18" charset="0"/>
-            </a:endParaRPr>
-          </a:p>
-        </p:txBody>
-      </p:sp>
-      <p:sp>
-        <p:nvSpPr>
-          <p:cNvPr id="1572867" name="Rectangle 3"/>
-          <p:cNvSpPr>
-            <a:spLocks noChangeArrowheads="1"/>
-          </p:cNvSpPr>
-          <p:nvPr/>
-        </p:nvSpPr>
-        <p:spPr bwMode="auto">
-          <a:xfrm>
-            <a:off x="1509713" y="3571875"/>
-            <a:ext cx="6137275" cy="1841500"/>
+            <a:off x="5130800" y="865188"/>
+            <a:ext cx="3627438" cy="2376487"/>
           </a:xfrm>
           <a:prstGeom prst="rect">
             <a:avLst/>
@@ -21804,241 +21660,6 @@
           <a:p>
             <a:pPr marL="285750" indent="-285750">
               <a:lnSpc>
-                <a:spcPct val="140000"/>
-              </a:lnSpc>
-              <a:spcBef>
-                <a:spcPct val="50000"/>
-              </a:spcBef>
-            </a:pPr>
-            <a:r>
-              <a:rPr lang="en-US" sz="2200" b="1">
-                <a:solidFill>
-                  <a:schemeClr val="bg2"/>
-                </a:solidFill>
-              </a:rPr>
-              <a:t>	</a:t>
-            </a:r>
-            <a:r>
-              <a:rPr lang="en-US" sz="2000" b="1">
-                <a:solidFill>
-                  <a:schemeClr val="bg2"/>
-                </a:solidFill>
-              </a:rPr>
-              <a:t>The voltage is provided at 120 V from the outside.  The light dimmer </a:t>
-            </a:r>
-            <a:r>
-              <a:rPr lang="en-US" sz="2000" b="1">
-                <a:solidFill>
-                  <a:schemeClr val="bg1"/>
-                </a:solidFill>
-                <a:effectLst>
-                  <a:outerShdw blurRad="38100" dist="38100" dir="2700000" algn="tl">
-                    <a:srgbClr val="000000"/>
-                  </a:outerShdw>
-                </a:effectLst>
-              </a:rPr>
-              <a:t>increases the resistance</a:t>
-            </a:r>
-            <a:r>
-              <a:rPr lang="en-US" sz="2000" b="1">
-                <a:solidFill>
-                  <a:schemeClr val="bg2"/>
-                </a:solidFill>
-              </a:rPr>
-              <a:t> and therefore </a:t>
-            </a:r>
-            <a:r>
-              <a:rPr lang="en-US" sz="2000" b="1">
-                <a:solidFill>
-                  <a:schemeClr val="bg1"/>
-                </a:solidFill>
-                <a:effectLst>
-                  <a:outerShdw blurRad="38100" dist="38100" dir="2700000" algn="tl">
-                    <a:srgbClr val="000000"/>
-                  </a:outerShdw>
-                </a:effectLst>
-              </a:rPr>
-              <a:t>decreases the current</a:t>
-            </a:r>
-            <a:r>
-              <a:rPr lang="en-US" sz="2000" b="1">
-                <a:solidFill>
-                  <a:schemeClr val="bg2"/>
-                </a:solidFill>
-              </a:rPr>
-              <a:t> that flows through the lightbulb.</a:t>
-            </a:r>
-          </a:p>
-        </p:txBody>
-      </p:sp>
-      <p:sp>
-        <p:nvSpPr>
-          <p:cNvPr id="1572869" name="Rectangle 5"/>
-          <p:cNvSpPr>
-            <a:spLocks noGrp="1" noChangeArrowheads="1"/>
-          </p:cNvSpPr>
-          <p:nvPr>
-            <p:ph type="title"/>
-          </p:nvPr>
-        </p:nvSpPr>
-        <p:spPr>
-          <a:xfrm>
-            <a:off x="660400" y="0"/>
-            <a:ext cx="8050213" cy="838200"/>
-          </a:xfrm>
-          <a:noFill/>
-          <a:ln/>
-        </p:spPr>
-        <p:txBody>
-          <a:bodyPr/>
-          <a:lstStyle/>
-          <a:p>
-            <a:pPr>
-              <a:lnSpc>
-                <a:spcPct val="90000"/>
-              </a:lnSpc>
-            </a:pPr>
-            <a:r>
-              <a:rPr lang="en-US" sz="2800" i="1"/>
-              <a:t>ConcepTest 18.4 </a:t>
-            </a:r>
-            <a:r>
-              <a:rPr lang="en-US" sz="2800" i="1">
-                <a:solidFill>
-                  <a:srgbClr val="000000"/>
-                </a:solidFill>
-                <a:effectLst/>
-              </a:rPr>
-              <a:t>	</a:t>
-            </a:r>
-            <a:r>
-              <a:rPr lang="en-US" sz="2800">
-                <a:solidFill>
-                  <a:schemeClr val="accent2"/>
-                </a:solidFill>
-              </a:rPr>
-              <a:t>Dimmer </a:t>
-            </a:r>
-          </a:p>
-        </p:txBody>
-      </p:sp>
-      <p:sp>
-        <p:nvSpPr>
-          <p:cNvPr id="1572871" name="Rectangle 7"/>
-          <p:cNvSpPr>
-            <a:spLocks noGrp="1" noChangeArrowheads="1"/>
-          </p:cNvSpPr>
-          <p:nvPr>
-            <p:ph idx="1"/>
-          </p:nvPr>
-        </p:nvSpPr>
-        <p:spPr>
-          <a:xfrm>
-            <a:off x="192088" y="1225550"/>
-            <a:ext cx="4546600" cy="1600200"/>
-          </a:xfrm>
-          <a:noFill/>
-          <a:ln/>
-        </p:spPr>
-        <p:txBody>
-          <a:bodyPr>
-            <a:normAutofit fontScale="70000" lnSpcReduction="20000"/>
-          </a:bodyPr>
-          <a:lstStyle/>
-          <a:p>
-            <a:pPr marL="401638" indent="-401638">
-              <a:lnSpc>
-                <a:spcPct val="150000"/>
-              </a:lnSpc>
-              <a:spcBef>
-                <a:spcPct val="50000"/>
-              </a:spcBef>
-              <a:buFont typeface="Monotype Sorts" pitchFamily="2" charset="2"/>
-              <a:buNone/>
-            </a:pPr>
-            <a:r>
-              <a:rPr lang="en-US" b="1">
-                <a:effectLst>
-                  <a:outerShdw blurRad="38100" dist="38100" dir="2700000" algn="tl">
-                    <a:srgbClr val="000000"/>
-                  </a:outerShdw>
-                </a:effectLst>
-              </a:rPr>
-              <a:t>	When you rotate the knob of a light dimmer, what is being changed in the electric circuit?</a:t>
-            </a:r>
-          </a:p>
-        </p:txBody>
-      </p:sp>
-      <p:sp>
-        <p:nvSpPr>
-          <p:cNvPr id="1572870" name="Oval 6"/>
-          <p:cNvSpPr>
-            <a:spLocks noChangeArrowheads="1"/>
-          </p:cNvSpPr>
-          <p:nvPr/>
-        </p:nvSpPr>
-        <p:spPr bwMode="auto">
-          <a:xfrm>
-            <a:off x="4829175" y="2295525"/>
-            <a:ext cx="3186113" cy="542925"/>
-          </a:xfrm>
-          <a:prstGeom prst="ellipse">
-            <a:avLst/>
-          </a:prstGeom>
-          <a:noFill/>
-          <a:ln w="38100">
-            <a:solidFill>
-              <a:schemeClr val="accent1"/>
-            </a:solidFill>
-            <a:round/>
-            <a:headEnd/>
-            <a:tailEnd/>
-          </a:ln>
-          <a:effectLst/>
-        </p:spPr>
-        <p:txBody>
-          <a:bodyPr anchor="ctr">
-            <a:spAutoFit/>
-          </a:bodyPr>
-          <a:lstStyle/>
-          <a:p>
-            <a:endParaRPr lang="en-US"/>
-          </a:p>
-        </p:txBody>
-      </p:sp>
-      <p:sp>
-        <p:nvSpPr>
-          <p:cNvPr id="1572872" name="Rectangle 8"/>
-          <p:cNvSpPr>
-            <a:spLocks noChangeArrowheads="1"/>
-          </p:cNvSpPr>
-          <p:nvPr/>
-        </p:nvSpPr>
-        <p:spPr bwMode="auto">
-          <a:xfrm>
-            <a:off x="5130800" y="865188"/>
-            <a:ext cx="3627438" cy="2376487"/>
-          </a:xfrm>
-          <a:prstGeom prst="rect">
-            <a:avLst/>
-          </a:prstGeom>
-          <a:noFill/>
-          <a:ln w="9525">
-            <a:noFill/>
-            <a:miter lim="800000"/>
-            <a:headEnd/>
-            <a:tailEnd/>
-          </a:ln>
-          <a:effectLst/>
-        </p:spPr>
-        <p:txBody>
-          <a:bodyPr lIns="92075" tIns="46038" rIns="92075" bIns="46038">
-            <a:spAutoFit/>
-          </a:bodyPr>
-          <a:lstStyle/>
-          <a:p>
-            <a:pPr marL="285750" indent="-285750">
-              <a:lnSpc>
                 <a:spcPct val="110000"/>
               </a:lnSpc>
               <a:spcBef>
@@ -22207,68 +21828,6 @@
                 </a:solidFill>
               </a:rPr>
               <a:t>5)   both (2) and (3)</a:t>
-            </a:r>
-          </a:p>
-        </p:txBody>
-      </p:sp>
-      <p:sp>
-        <p:nvSpPr>
-          <p:cNvPr id="1572873" name="Text Box 9"/>
-          <p:cNvSpPr txBox="1">
-            <a:spLocks noChangeArrowheads="1"/>
-          </p:cNvSpPr>
-          <p:nvPr/>
-        </p:nvSpPr>
-        <p:spPr bwMode="auto">
-          <a:xfrm>
-            <a:off x="803275" y="6161088"/>
-            <a:ext cx="6869113" cy="406400"/>
-          </a:xfrm>
-          <a:prstGeom prst="rect">
-            <a:avLst/>
-          </a:prstGeom>
-          <a:solidFill>
-            <a:srgbClr val="3366FF"/>
-          </a:solidFill>
-          <a:ln w="9525">
-            <a:solidFill>
-              <a:schemeClr val="tx2"/>
-            </a:solidFill>
-            <a:miter lim="800000"/>
-            <a:headEnd type="none" w="sm" len="sm"/>
-            <a:tailEnd type="none" w="sm" len="sm"/>
-          </a:ln>
-          <a:effectLst/>
-        </p:spPr>
-        <p:txBody>
-          <a:bodyPr>
-            <a:spAutoFit/>
-          </a:bodyPr>
-          <a:lstStyle/>
-          <a:p>
-            <a:pPr algn="ctr"/>
-            <a:r>
-              <a:rPr lang="en-US" sz="2000" b="1">
-                <a:solidFill>
-                  <a:srgbClr val="000000"/>
-                </a:solidFill>
-                <a:effectLst>
-                  <a:outerShdw blurRad="38100" dist="38100" dir="2700000" algn="tl">
-                    <a:srgbClr val="FFFFFF"/>
-                  </a:outerShdw>
-                </a:effectLst>
-              </a:rPr>
-              <a:t>Follow-up:</a:t>
-            </a:r>
-            <a:r>
-              <a:rPr lang="en-US" sz="2000" b="1">
-                <a:effectLst>
-                  <a:outerShdw blurRad="38100" dist="38100" dir="2700000" algn="tl">
-                    <a:srgbClr val="000000"/>
-                  </a:outerShdw>
-                </a:effectLst>
-              </a:rPr>
-              <a:t>  Why does the voltage not change?</a:t>
             </a:r>
           </a:p>
         </p:txBody>
@@ -22300,180 +21859,7 @@
       </p:grpSpPr>
       <p:sp>
         <p:nvSpPr>
-          <p:cNvPr id="1574915" name="Rectangle 3"/>
-          <p:cNvSpPr>
-            <a:spLocks noGrp="1" noChangeArrowheads="1"/>
-          </p:cNvSpPr>
-          <p:nvPr>
-            <p:ph type="title"/>
-          </p:nvPr>
-        </p:nvSpPr>
-        <p:spPr>
-          <a:xfrm>
-            <a:off x="660400" y="0"/>
-            <a:ext cx="8050213" cy="838200"/>
-          </a:xfrm>
-          <a:noFill/>
-          <a:ln/>
-        </p:spPr>
-        <p:txBody>
-          <a:bodyPr/>
-          <a:lstStyle/>
-          <a:p>
-            <a:pPr>
-              <a:lnSpc>
-                <a:spcPct val="90000"/>
-              </a:lnSpc>
-            </a:pPr>
-            <a:r>
-              <a:rPr lang="en-US" sz="2800" i="1"/>
-              <a:t>ConcepTest 18.5a	</a:t>
-            </a:r>
-            <a:r>
-              <a:rPr lang="en-US" sz="2800">
-                <a:solidFill>
-                  <a:schemeClr val="accent2"/>
-                </a:solidFill>
-              </a:rPr>
-              <a:t>Lightbulbs</a:t>
-            </a:r>
-          </a:p>
-        </p:txBody>
-      </p:sp>
-      <p:sp>
-        <p:nvSpPr>
-          <p:cNvPr id="1574917" name="Rectangle 5"/>
-          <p:cNvSpPr>
-            <a:spLocks noGrp="1" noChangeArrowheads="1"/>
-          </p:cNvSpPr>
-          <p:nvPr>
-            <p:ph idx="1"/>
-          </p:nvPr>
-        </p:nvSpPr>
-        <p:spPr>
-          <a:xfrm>
-            <a:off x="0" y="855663"/>
-            <a:ext cx="5237163" cy="2057400"/>
-          </a:xfrm>
-          <a:noFill/>
-          <a:ln/>
-        </p:spPr>
-        <p:txBody>
-          <a:bodyPr>
-            <a:normAutofit fontScale="70000" lnSpcReduction="20000"/>
-          </a:bodyPr>
-          <a:lstStyle/>
-          <a:p>
-            <a:pPr marL="401638" indent="-401638">
-              <a:lnSpc>
-                <a:spcPct val="140000"/>
-              </a:lnSpc>
-              <a:spcBef>
-                <a:spcPct val="50000"/>
-              </a:spcBef>
-              <a:buFont typeface="Monotype Sorts" pitchFamily="2" charset="2"/>
-              <a:buNone/>
-            </a:pPr>
-            <a:r>
-              <a:rPr lang="en-US" sz="2200" b="1">
-                <a:effectLst>
-                  <a:outerShdw blurRad="38100" dist="38100" dir="2700000" algn="tl">
-                    <a:srgbClr val="000000"/>
-                  </a:outerShdw>
-                </a:effectLst>
-              </a:rPr>
-              <a:t>	</a:t>
-            </a:r>
-            <a:r>
-              <a:rPr lang="en-US" b="1">
-                <a:effectLst>
-                  <a:outerShdw blurRad="38100" dist="38100" dir="2700000" algn="tl">
-                    <a:srgbClr val="000000"/>
-                  </a:outerShdw>
-                </a:effectLst>
-              </a:rPr>
-              <a:t>Two lightbulbs operate at 120 V, but one has a power rating of </a:t>
-            </a:r>
-            <a:r>
-              <a:rPr lang="en-US" b="1">
-                <a:solidFill>
-                  <a:schemeClr val="tx2"/>
-                </a:solidFill>
-                <a:effectLst>
-                  <a:outerShdw blurRad="38100" dist="38100" dir="2700000" algn="tl">
-                    <a:srgbClr val="000000"/>
-                  </a:outerShdw>
-                </a:effectLst>
-              </a:rPr>
-              <a:t>25 W</a:t>
-            </a:r>
-            <a:r>
-              <a:rPr lang="en-US" b="1">
-                <a:effectLst>
-                  <a:outerShdw blurRad="38100" dist="38100" dir="2700000" algn="tl">
-                    <a:srgbClr val="000000"/>
-                  </a:outerShdw>
-                </a:effectLst>
-              </a:rPr>
-              <a:t> while the other has a power rating of </a:t>
-            </a:r>
-            <a:r>
-              <a:rPr lang="en-US" b="1">
-                <a:solidFill>
-                  <a:schemeClr val="tx2"/>
-                </a:solidFill>
-                <a:effectLst>
-                  <a:outerShdw blurRad="38100" dist="38100" dir="2700000" algn="tl">
-                    <a:srgbClr val="000000"/>
-                  </a:outerShdw>
-                </a:effectLst>
-              </a:rPr>
-              <a:t>100 W</a:t>
-            </a:r>
-            <a:r>
-              <a:rPr lang="en-US" b="1">
-                <a:effectLst>
-                  <a:outerShdw blurRad="38100" dist="38100" dir="2700000" algn="tl">
-                    <a:srgbClr val="000000"/>
-                  </a:outerShdw>
-                </a:effectLst>
-              </a:rPr>
-              <a:t>.  Which one has the greater resistance? </a:t>
-            </a:r>
-          </a:p>
-        </p:txBody>
-      </p:sp>
-      <p:pic>
-        <p:nvPicPr>
-          <p:cNvPr id="1574916" name="Picture 4" descr="FG18_015"/>
-          <p:cNvPicPr>
-            <a:picLocks noChangeAspect="1" noChangeArrowheads="1"/>
-          </p:cNvPicPr>
-          <p:nvPr/>
-        </p:nvPicPr>
-        <p:blipFill>
-          <a:blip r:embed="rId3" cstate="print">
-            <a:lum bright="-30000" contrast="48000"/>
-          </a:blip>
-          <a:srcRect l="26016" t="20274" r="29951" b="9998"/>
-          <a:stretch>
-            <a:fillRect/>
-          </a:stretch>
-        </p:blipFill>
-        <p:spPr bwMode="auto">
-          <a:xfrm>
-            <a:off x="6403975" y="3362325"/>
-            <a:ext cx="2740025" cy="2892425"/>
-          </a:xfrm>
-          <a:prstGeom prst="rect">
-            <a:avLst/>
-          </a:prstGeom>
-          <a:noFill/>
-        </p:spPr>
-      </p:pic>
-      <p:sp>
-        <p:nvSpPr>
-          <p:cNvPr id="1574918" name="Rectangle 6"/>
+          <p:cNvPr id="1572866" name="AutoShape 2"/>
           <p:cNvSpPr>
             <a:spLocks noChangeArrowheads="1"/>
           </p:cNvSpPr>
@@ -22481,8 +21867,50 @@
         </p:nvSpPr>
         <p:spPr bwMode="auto">
           <a:xfrm>
-            <a:off x="5521325" y="842963"/>
-            <a:ext cx="3622675" cy="2224087"/>
+            <a:off x="1565275" y="3568700"/>
+            <a:ext cx="6205538" cy="2062163"/>
+          </a:xfrm>
+          <a:prstGeom prst="roundRect">
+            <a:avLst>
+              <a:gd name="adj" fmla="val 16667"/>
+            </a:avLst>
+          </a:prstGeom>
+          <a:solidFill>
+            <a:schemeClr val="accent1"/>
+          </a:solidFill>
+          <a:ln w="38100">
+            <a:solidFill>
+              <a:srgbClr val="000000"/>
+            </a:solidFill>
+            <a:round/>
+            <a:headEnd type="none" w="sm" len="sm"/>
+            <a:tailEnd type="none" w="sm" len="sm"/>
+          </a:ln>
+          <a:effectLst/>
+        </p:spPr>
+        <p:txBody>
+          <a:bodyPr wrap="none" anchor="ctr"/>
+          <a:lstStyle/>
+          <a:p>
+            <a:pPr algn="ctr"/>
+            <a:endParaRPr lang="en-US">
+              <a:latin typeface="Times New Roman" pitchFamily="18" charset="0"/>
+            </a:endParaRPr>
+          </a:p>
+        </p:txBody>
+      </p:sp>
+      <p:sp>
+        <p:nvSpPr>
+          <p:cNvPr id="1572867" name="Rectangle 3"/>
+          <p:cNvSpPr>
+            <a:spLocks noChangeArrowheads="1"/>
+          </p:cNvSpPr>
+          <p:nvPr/>
+        </p:nvSpPr>
+        <p:spPr bwMode="auto">
+          <a:xfrm>
+            <a:off x="1509713" y="3571875"/>
+            <a:ext cx="6137275" cy="1841500"/>
           </a:xfrm>
           <a:prstGeom prst="rect">
             <a:avLst/>
@@ -22504,6 +21932,241 @@
           <a:p>
             <a:pPr marL="285750" indent="-285750">
               <a:lnSpc>
+                <a:spcPct val="140000"/>
+              </a:lnSpc>
+              <a:spcBef>
+                <a:spcPct val="50000"/>
+              </a:spcBef>
+            </a:pPr>
+            <a:r>
+              <a:rPr lang="en-US" sz="2200" b="1">
+                <a:solidFill>
+                  <a:schemeClr val="bg2"/>
+                </a:solidFill>
+              </a:rPr>
+              <a:t>	</a:t>
+            </a:r>
+            <a:r>
+              <a:rPr lang="en-US" sz="2000" b="1">
+                <a:solidFill>
+                  <a:schemeClr val="bg2"/>
+                </a:solidFill>
+              </a:rPr>
+              <a:t>The voltage is provided at 120 V from the outside.  The light dimmer </a:t>
+            </a:r>
+            <a:r>
+              <a:rPr lang="en-US" sz="2000" b="1">
+                <a:solidFill>
+                  <a:schemeClr val="bg1"/>
+                </a:solidFill>
+                <a:effectLst>
+                  <a:outerShdw blurRad="38100" dist="38100" dir="2700000" algn="tl">
+                    <a:srgbClr val="000000"/>
+                  </a:outerShdw>
+                </a:effectLst>
+              </a:rPr>
+              <a:t>increases the resistance</a:t>
+            </a:r>
+            <a:r>
+              <a:rPr lang="en-US" sz="2000" b="1">
+                <a:solidFill>
+                  <a:schemeClr val="bg2"/>
+                </a:solidFill>
+              </a:rPr>
+              <a:t> and therefore </a:t>
+            </a:r>
+            <a:r>
+              <a:rPr lang="en-US" sz="2000" b="1">
+                <a:solidFill>
+                  <a:schemeClr val="bg1"/>
+                </a:solidFill>
+                <a:effectLst>
+                  <a:outerShdw blurRad="38100" dist="38100" dir="2700000" algn="tl">
+                    <a:srgbClr val="000000"/>
+                  </a:outerShdw>
+                </a:effectLst>
+              </a:rPr>
+              <a:t>decreases the current</a:t>
+            </a:r>
+            <a:r>
+              <a:rPr lang="en-US" sz="2000" b="1">
+                <a:solidFill>
+                  <a:schemeClr val="bg2"/>
+                </a:solidFill>
+              </a:rPr>
+              <a:t> that flows through the lightbulb.</a:t>
+            </a:r>
+          </a:p>
+        </p:txBody>
+      </p:sp>
+      <p:sp>
+        <p:nvSpPr>
+          <p:cNvPr id="1572869" name="Rectangle 5"/>
+          <p:cNvSpPr>
+            <a:spLocks noGrp="1" noChangeArrowheads="1"/>
+          </p:cNvSpPr>
+          <p:nvPr>
+            <p:ph type="title"/>
+          </p:nvPr>
+        </p:nvSpPr>
+        <p:spPr>
+          <a:xfrm>
+            <a:off x="660400" y="0"/>
+            <a:ext cx="8050213" cy="838200"/>
+          </a:xfrm>
+          <a:noFill/>
+          <a:ln/>
+        </p:spPr>
+        <p:txBody>
+          <a:bodyPr/>
+          <a:lstStyle/>
+          <a:p>
+            <a:pPr>
+              <a:lnSpc>
+                <a:spcPct val="90000"/>
+              </a:lnSpc>
+            </a:pPr>
+            <a:r>
+              <a:rPr lang="en-US" sz="2800" i="1"/>
+              <a:t>ConcepTest 18.4 </a:t>
+            </a:r>
+            <a:r>
+              <a:rPr lang="en-US" sz="2800" i="1">
+                <a:solidFill>
+                  <a:srgbClr val="000000"/>
+                </a:solidFill>
+                <a:effectLst/>
+              </a:rPr>
+              <a:t>	</a:t>
+            </a:r>
+            <a:r>
+              <a:rPr lang="en-US" sz="2800">
+                <a:solidFill>
+                  <a:schemeClr val="accent2"/>
+                </a:solidFill>
+              </a:rPr>
+              <a:t>Dimmer </a:t>
+            </a:r>
+          </a:p>
+        </p:txBody>
+      </p:sp>
+      <p:sp>
+        <p:nvSpPr>
+          <p:cNvPr id="1572871" name="Rectangle 7"/>
+          <p:cNvSpPr>
+            <a:spLocks noGrp="1" noChangeArrowheads="1"/>
+          </p:cNvSpPr>
+          <p:nvPr>
+            <p:ph idx="1"/>
+          </p:nvPr>
+        </p:nvSpPr>
+        <p:spPr>
+          <a:xfrm>
+            <a:off x="192088" y="1225550"/>
+            <a:ext cx="4546600" cy="1600200"/>
+          </a:xfrm>
+          <a:noFill/>
+          <a:ln/>
+        </p:spPr>
+        <p:txBody>
+          <a:bodyPr>
+            <a:normAutofit fontScale="70000" lnSpcReduction="20000"/>
+          </a:bodyPr>
+          <a:lstStyle/>
+          <a:p>
+            <a:pPr marL="401638" indent="-401638">
+              <a:lnSpc>
+                <a:spcPct val="150000"/>
+              </a:lnSpc>
+              <a:spcBef>
+                <a:spcPct val="50000"/>
+              </a:spcBef>
+              <a:buFont typeface="Monotype Sorts" pitchFamily="2" charset="2"/>
+              <a:buNone/>
+            </a:pPr>
+            <a:r>
+              <a:rPr lang="en-US" b="1">
+                <a:effectLst>
+                  <a:outerShdw blurRad="38100" dist="38100" dir="2700000" algn="tl">
+                    <a:srgbClr val="000000"/>
+                  </a:outerShdw>
+                </a:effectLst>
+              </a:rPr>
+              <a:t>	When you rotate the knob of a light dimmer, what is being changed in the electric circuit?</a:t>
+            </a:r>
+          </a:p>
+        </p:txBody>
+      </p:sp>
+      <p:sp>
+        <p:nvSpPr>
+          <p:cNvPr id="1572870" name="Oval 6"/>
+          <p:cNvSpPr>
+            <a:spLocks noChangeArrowheads="1"/>
+          </p:cNvSpPr>
+          <p:nvPr/>
+        </p:nvSpPr>
+        <p:spPr bwMode="auto">
+          <a:xfrm>
+            <a:off x="4829175" y="2295525"/>
+            <a:ext cx="3186113" cy="542925"/>
+          </a:xfrm>
+          <a:prstGeom prst="ellipse">
+            <a:avLst/>
+          </a:prstGeom>
+          <a:noFill/>
+          <a:ln w="38100">
+            <a:solidFill>
+              <a:schemeClr val="accent1"/>
+            </a:solidFill>
+            <a:round/>
+            <a:headEnd/>
+            <a:tailEnd/>
+          </a:ln>
+          <a:effectLst/>
+        </p:spPr>
+        <p:txBody>
+          <a:bodyPr anchor="ctr">
+            <a:spAutoFit/>
+          </a:bodyPr>
+          <a:lstStyle/>
+          <a:p>
+            <a:endParaRPr lang="en-US"/>
+          </a:p>
+        </p:txBody>
+      </p:sp>
+      <p:sp>
+        <p:nvSpPr>
+          <p:cNvPr id="1572872" name="Rectangle 8"/>
+          <p:cNvSpPr>
+            <a:spLocks noChangeArrowheads="1"/>
+          </p:cNvSpPr>
+          <p:nvPr/>
+        </p:nvSpPr>
+        <p:spPr bwMode="auto">
+          <a:xfrm>
+            <a:off x="5130800" y="865188"/>
+            <a:ext cx="3627438" cy="2376487"/>
+          </a:xfrm>
+          <a:prstGeom prst="rect">
+            <a:avLst/>
+          </a:prstGeom>
+          <a:noFill/>
+          <a:ln w="9525">
+            <a:noFill/>
+            <a:miter lim="800000"/>
+            <a:headEnd/>
+            <a:tailEnd/>
+          </a:ln>
+          <a:effectLst/>
+        </p:spPr>
+        <p:txBody>
+          <a:bodyPr lIns="92075" tIns="46038" rIns="92075" bIns="46038">
+            <a:spAutoFit/>
+          </a:bodyPr>
+          <a:lstStyle/>
+          <a:p>
+            <a:pPr marL="285750" indent="-285750">
+              <a:lnSpc>
                 <a:spcPct val="110000"/>
               </a:lnSpc>
               <a:spcBef>
@@ -22537,7 +22200,7 @@
                   <a:schemeClr val="tx2"/>
                 </a:solidFill>
               </a:rPr>
-              <a:t>the 25 W bulb</a:t>
+              <a:t>the power</a:t>
             </a:r>
             <a:endParaRPr lang="en-US" sz="2000" b="1">
               <a:solidFill>
@@ -22586,7 +22249,7 @@
                   <a:schemeClr val="tx2"/>
                 </a:solidFill>
               </a:rPr>
-              <a:t>the 100 W bulb</a:t>
+              <a:t>the current</a:t>
             </a:r>
             <a:endParaRPr lang="en-US" sz="2000" b="1">
               <a:solidFill>
@@ -22635,7 +22298,7 @@
                   <a:schemeClr val="tx2"/>
                 </a:solidFill>
               </a:rPr>
-              <a:t>both have the same</a:t>
+              <a:t>the voltage</a:t>
             </a:r>
           </a:p>
           <a:p>
@@ -22653,9 +22316,88 @@
                   <a:schemeClr val="tx2"/>
                 </a:solidFill>
               </a:rPr>
-              <a:t>4)   this has nothing to do with resistance</a:t>
-            </a:r>
-            <a:endParaRPr lang="en-US" sz="2000" b="1"/>
+              <a:t>4)   both (1) and (2)</a:t>
+            </a:r>
+          </a:p>
+          <a:p>
+            <a:pPr marL="285750" indent="-285750">
+              <a:lnSpc>
+                <a:spcPct val="110000"/>
+              </a:lnSpc>
+              <a:spcBef>
+                <a:spcPct val="50000"/>
+              </a:spcBef>
+            </a:pPr>
+            <a:r>
+              <a:rPr lang="en-US" sz="2000" b="1">
+                <a:solidFill>
+                  <a:schemeClr val="tx2"/>
+                </a:solidFill>
+              </a:rPr>
+              <a:t>5)   both (2) and (3)</a:t>
+            </a:r>
+          </a:p>
+        </p:txBody>
+      </p:sp>
+      <p:sp>
+        <p:nvSpPr>
+          <p:cNvPr id="1572873" name="Text Box 9"/>
+          <p:cNvSpPr txBox="1">
+            <a:spLocks noChangeArrowheads="1"/>
+          </p:cNvSpPr>
+          <p:nvPr/>
+        </p:nvSpPr>
+        <p:spPr bwMode="auto">
+          <a:xfrm>
+            <a:off x="803275" y="6161088"/>
+            <a:ext cx="6869113" cy="406400"/>
+          </a:xfrm>
+          <a:prstGeom prst="rect">
+            <a:avLst/>
+          </a:prstGeom>
+          <a:solidFill>
+            <a:srgbClr val="3366FF"/>
+          </a:solidFill>
+          <a:ln w="9525">
+            <a:solidFill>
+              <a:schemeClr val="tx2"/>
+            </a:solidFill>
+            <a:miter lim="800000"/>
+            <a:headEnd type="none" w="sm" len="sm"/>
+            <a:tailEnd type="none" w="sm" len="sm"/>
+          </a:ln>
+          <a:effectLst/>
+        </p:spPr>
+        <p:txBody>
+          <a:bodyPr>
+            <a:spAutoFit/>
+          </a:bodyPr>
+          <a:lstStyle/>
+          <a:p>
+            <a:pPr algn="ctr"/>
+            <a:r>
+              <a:rPr lang="en-US" sz="2000" b="1">
+                <a:solidFill>
+                  <a:srgbClr val="000000"/>
+                </a:solidFill>
+                <a:effectLst>
+                  <a:outerShdw blurRad="38100" dist="38100" dir="2700000" algn="tl">
+                    <a:srgbClr val="FFFFFF"/>
+                  </a:outerShdw>
+                </a:effectLst>
+              </a:rPr>
+              <a:t>Follow-up:</a:t>
+            </a:r>
+            <a:r>
+              <a:rPr lang="en-US" sz="2000" b="1">
+                <a:effectLst>
+                  <a:outerShdw blurRad="38100" dist="38100" dir="2700000" algn="tl">
+                    <a:srgbClr val="000000"/>
+                  </a:outerShdw>
+                </a:effectLst>
+              </a:rPr>
+              <a:t>  Why does the voltage not change?</a:t>
+            </a:r>
           </a:p>
         </p:txBody>
       </p:sp>
@@ -22686,202 +22428,7 @@
       </p:grpSpPr>
       <p:sp>
         <p:nvSpPr>
-          <p:cNvPr id="1576962" name="AutoShape 2"/>
-          <p:cNvSpPr>
-            <a:spLocks noChangeArrowheads="1"/>
-          </p:cNvSpPr>
-          <p:nvPr/>
-        </p:nvSpPr>
-        <p:spPr bwMode="auto">
-          <a:xfrm>
-            <a:off x="271463" y="3898900"/>
-            <a:ext cx="5465762" cy="1543050"/>
-          </a:xfrm>
-          <a:prstGeom prst="roundRect">
-            <a:avLst>
-              <a:gd name="adj" fmla="val 16667"/>
-            </a:avLst>
-          </a:prstGeom>
-          <a:solidFill>
-            <a:schemeClr val="accent1"/>
-          </a:solidFill>
-          <a:ln w="38100">
-            <a:solidFill>
-              <a:srgbClr val="000000"/>
-            </a:solidFill>
-            <a:round/>
-            <a:headEnd type="none" w="sm" len="sm"/>
-            <a:tailEnd type="none" w="sm" len="sm"/>
-          </a:ln>
-          <a:effectLst/>
-        </p:spPr>
-        <p:txBody>
-          <a:bodyPr wrap="none" anchor="ctr"/>
-          <a:lstStyle/>
-          <a:p>
-            <a:pPr algn="ctr"/>
-            <a:endParaRPr lang="en-US">
-              <a:latin typeface="Times New Roman" pitchFamily="18" charset="0"/>
-            </a:endParaRPr>
-          </a:p>
-        </p:txBody>
-      </p:sp>
-      <p:sp>
-        <p:nvSpPr>
-          <p:cNvPr id="1576963" name="Rectangle 3"/>
-          <p:cNvSpPr>
-            <a:spLocks noChangeArrowheads="1"/>
-          </p:cNvSpPr>
-          <p:nvPr/>
-        </p:nvSpPr>
-        <p:spPr bwMode="auto">
-          <a:xfrm>
-            <a:off x="192088" y="3956050"/>
-            <a:ext cx="5738812" cy="1282700"/>
-          </a:xfrm>
-          <a:prstGeom prst="rect">
-            <a:avLst/>
-          </a:prstGeom>
-          <a:noFill/>
-          <a:ln w="9525">
-            <a:noFill/>
-            <a:miter lim="800000"/>
-            <a:headEnd/>
-            <a:tailEnd/>
-          </a:ln>
-          <a:effectLst/>
-        </p:spPr>
-        <p:txBody>
-          <a:bodyPr lIns="92075" tIns="46038" rIns="92075" bIns="46038">
-            <a:spAutoFit/>
-          </a:bodyPr>
-          <a:lstStyle/>
-          <a:p>
-            <a:pPr marL="285750" indent="-285750">
-              <a:lnSpc>
-                <a:spcPct val="130000"/>
-              </a:lnSpc>
-              <a:spcBef>
-                <a:spcPct val="50000"/>
-              </a:spcBef>
-            </a:pPr>
-            <a:r>
-              <a:rPr lang="en-US" sz="2000" b="1">
-                <a:solidFill>
-                  <a:schemeClr val="bg2"/>
-                </a:solidFill>
-              </a:rPr>
-              <a:t>	Since   </a:t>
-            </a:r>
-            <a:r>
-              <a:rPr lang="en-US" sz="2000" b="1" i="1">
-                <a:solidFill>
-                  <a:srgbClr val="990000"/>
-                </a:solidFill>
-                <a:effectLst>
-                  <a:outerShdw blurRad="38100" dist="38100" dir="2700000" algn="tl">
-                    <a:srgbClr val="000000"/>
-                  </a:outerShdw>
-                </a:effectLst>
-                <a:latin typeface="Times New Roman" pitchFamily="18" charset="0"/>
-              </a:rPr>
-              <a:t>P = V</a:t>
-            </a:r>
-            <a:r>
-              <a:rPr lang="en-US" sz="2000" b="1" i="1" baseline="30000">
-                <a:solidFill>
-                  <a:srgbClr val="990000"/>
-                </a:solidFill>
-                <a:effectLst>
-                  <a:outerShdw blurRad="38100" dist="38100" dir="2700000" algn="tl">
-                    <a:srgbClr val="000000"/>
-                  </a:outerShdw>
-                </a:effectLst>
-                <a:latin typeface="Times New Roman" pitchFamily="18" charset="0"/>
-              </a:rPr>
-              <a:t>2</a:t>
-            </a:r>
-            <a:r>
-              <a:rPr lang="en-US" sz="2000" b="1" i="1">
-                <a:solidFill>
-                  <a:srgbClr val="990000"/>
-                </a:solidFill>
-                <a:effectLst>
-                  <a:outerShdw blurRad="38100" dist="38100" dir="2700000" algn="tl">
-                    <a:srgbClr val="000000"/>
-                  </a:outerShdw>
-                </a:effectLst>
-                <a:latin typeface="Times New Roman" pitchFamily="18" charset="0"/>
-              </a:rPr>
-              <a:t> / R</a:t>
-            </a:r>
-            <a:r>
-              <a:rPr lang="en-US" sz="2000" b="1" i="1">
-                <a:effectLst>
-                  <a:outerShdw blurRad="38100" dist="38100" dir="2700000" algn="tl">
-                    <a:srgbClr val="000000"/>
-                  </a:outerShdw>
-                </a:effectLst>
-                <a:latin typeface="Times New Roman" pitchFamily="18" charset="0"/>
-              </a:rPr>
-              <a:t>   </a:t>
-            </a:r>
-            <a:r>
-              <a:rPr lang="en-US" sz="2000" b="1">
-                <a:solidFill>
-                  <a:schemeClr val="bg2"/>
-                </a:solidFill>
-              </a:rPr>
-              <a:t>the bulb with the </a:t>
-            </a:r>
-            <a:r>
-              <a:rPr lang="en-US" sz="2000" b="1">
-                <a:solidFill>
-                  <a:srgbClr val="0066FF"/>
-                </a:solidFill>
-                <a:effectLst>
-                  <a:outerShdw blurRad="38100" dist="38100" dir="2700000" algn="tl">
-                    <a:srgbClr val="000000"/>
-                  </a:outerShdw>
-                </a:effectLst>
-              </a:rPr>
-              <a:t>lower power rating</a:t>
-            </a:r>
-            <a:r>
-              <a:rPr lang="en-US" sz="2000" b="1">
-                <a:solidFill>
-                  <a:schemeClr val="bg2"/>
-                </a:solidFill>
-              </a:rPr>
-              <a:t> has to have the </a:t>
-            </a:r>
-            <a:r>
-              <a:rPr lang="en-US" sz="2000" b="1">
-                <a:solidFill>
-                  <a:srgbClr val="0066FF"/>
-                </a:solidFill>
-                <a:effectLst>
-                  <a:outerShdw blurRad="38100" dist="38100" dir="2700000" algn="tl">
-                    <a:srgbClr val="000000"/>
-                  </a:outerShdw>
-                </a:effectLst>
-              </a:rPr>
-              <a:t>higher resistance</a:t>
-            </a:r>
-            <a:r>
-              <a:rPr lang="en-US" sz="2000" b="1">
-                <a:solidFill>
-                  <a:schemeClr val="bg2"/>
-                </a:solidFill>
-              </a:rPr>
-              <a:t>.</a:t>
-            </a:r>
-          </a:p>
-        </p:txBody>
-      </p:sp>
-      <p:sp>
-        <p:nvSpPr>
-          <p:cNvPr id="1576965" name="Rectangle 5"/>
+          <p:cNvPr id="1574915" name="Rectangle 3"/>
           <p:cNvSpPr>
             <a:spLocks noGrp="1" noChangeArrowheads="1"/>
           </p:cNvSpPr>
@@ -22908,7 +22455,7 @@
             </a:pPr>
             <a:r>
               <a:rPr lang="en-US" sz="2800" i="1"/>
-              <a:t>ConcepTest 18.5a      </a:t>
+              <a:t>ConcepTest 18.5a	</a:t>
             </a:r>
             <a:r>
               <a:rPr lang="en-US" sz="2800">
@@ -22923,7 +22470,7 @@
       </p:sp>
       <p:sp>
         <p:nvSpPr>
-          <p:cNvPr id="1576968" name="Rectangle 8"/>
+          <p:cNvPr id="1574917" name="Rectangle 5"/>
           <p:cNvSpPr>
             <a:spLocks noGrp="1" noChangeArrowheads="1"/>
           </p:cNvSpPr>
@@ -23024,46 +22571,9 @@
           </a:p>
         </p:txBody>
       </p:sp>
-      <p:sp>
-        <p:nvSpPr>
-          <p:cNvPr id="1576966" name="Oval 6"/>
-          <p:cNvSpPr>
-            <a:spLocks noChangeArrowheads="1"/>
-          </p:cNvSpPr>
-          <p:nvPr/>
-        </p:nvSpPr>
-        <p:spPr bwMode="auto">
-          <a:xfrm>
-            <a:off x="5416550" y="795338"/>
-            <a:ext cx="3167063" cy="571500"/>
-          </a:xfrm>
-          <a:prstGeom prst="ellipse">
-            <a:avLst/>
-          </a:prstGeom>
-          <a:noFill/>
-          <a:ln w="38100">
-            <a:solidFill>
-              <a:schemeClr val="accent1"/>
-            </a:solidFill>
-            <a:round/>
-            <a:headEnd/>
-            <a:tailEnd/>
-          </a:ln>
-          <a:effectLst/>
-        </p:spPr>
-        <p:txBody>
-          <a:bodyPr anchor="ctr">
-            <a:spAutoFit/>
-          </a:bodyPr>
-          <a:lstStyle/>
-          <a:p>
-            <a:endParaRPr lang="en-US"/>
-          </a:p>
-        </p:txBody>
-      </p:sp>
       <p:pic>
         <p:nvPicPr>
-          <p:cNvPr id="1576967" name="Picture 7" descr="FG18_015"/>
+          <p:cNvPr id="1574916" name="Picture 4" descr="FG18_015"/>
           <p:cNvPicPr>
             <a:picLocks noChangeAspect="1" noChangeArrowheads="1"/>
           </p:cNvPicPr>
@@ -23091,7 +22601,7 @@
       </p:pic>
       <p:sp>
         <p:nvSpPr>
-          <p:cNvPr id="1576969" name="Rectangle 9"/>
+          <p:cNvPr id="1574918" name="Rectangle 6"/>
           <p:cNvSpPr>
             <a:spLocks noChangeArrowheads="1"/>
           </p:cNvSpPr>
@@ -23274,68 +22784,6 @@
               <a:t>4)   this has nothing to do with resistance</a:t>
             </a:r>
             <a:endParaRPr lang="en-US" sz="2000" b="1"/>
-          </a:p>
-        </p:txBody>
-      </p:sp>
-      <p:sp>
-        <p:nvSpPr>
-          <p:cNvPr id="1576970" name="Text Box 10"/>
-          <p:cNvSpPr txBox="1">
-            <a:spLocks noChangeArrowheads="1"/>
-          </p:cNvSpPr>
-          <p:nvPr/>
-        </p:nvSpPr>
-        <p:spPr bwMode="auto">
-          <a:xfrm>
-            <a:off x="0" y="6161088"/>
-            <a:ext cx="6378575" cy="406400"/>
-          </a:xfrm>
-          <a:prstGeom prst="rect">
-            <a:avLst/>
-          </a:prstGeom>
-          <a:solidFill>
-            <a:srgbClr val="3366FF"/>
-          </a:solidFill>
-          <a:ln w="9525">
-            <a:solidFill>
-              <a:schemeClr val="tx2"/>
-            </a:solidFill>
-            <a:miter lim="800000"/>
-            <a:headEnd type="none" w="sm" len="sm"/>
-            <a:tailEnd type="none" w="sm" len="sm"/>
-          </a:ln>
-          <a:effectLst/>
-        </p:spPr>
-        <p:txBody>
-          <a:bodyPr>
-            <a:spAutoFit/>
-          </a:bodyPr>
-          <a:lstStyle/>
-          <a:p>
-            <a:pPr algn="ctr"/>
-            <a:r>
-              <a:rPr lang="en-US" sz="2000" b="1">
-                <a:solidFill>
-                  <a:srgbClr val="000000"/>
-                </a:solidFill>
-                <a:effectLst>
-                  <a:outerShdw blurRad="38100" dist="38100" dir="2700000" algn="tl">
-                    <a:srgbClr val="FFFFFF"/>
-                  </a:outerShdw>
-                </a:effectLst>
-              </a:rPr>
-              <a:t>Follow-up:</a:t>
-            </a:r>
-            <a:r>
-              <a:rPr lang="en-US" sz="2000" b="1">
-                <a:effectLst>
-                  <a:outerShdw blurRad="38100" dist="38100" dir="2700000" algn="tl">
-                    <a:srgbClr val="000000"/>
-                  </a:outerShdw>
-                </a:effectLst>
-              </a:rPr>
-              <a:t>  Which one carries the greater current?</a:t>
-            </a:r>
           </a:p>
         </p:txBody>
       </p:sp>
@@ -23366,138 +22814,7 @@
       </p:grpSpPr>
       <p:sp>
         <p:nvSpPr>
-          <p:cNvPr id="1579011" name="Rectangle 3"/>
-          <p:cNvSpPr>
-            <a:spLocks noGrp="1" noChangeArrowheads="1"/>
-          </p:cNvSpPr>
-          <p:nvPr>
-            <p:ph type="title"/>
-          </p:nvPr>
-        </p:nvSpPr>
-        <p:spPr>
-          <a:xfrm>
-            <a:off x="660400" y="0"/>
-            <a:ext cx="8050213" cy="838200"/>
-          </a:xfrm>
-          <a:noFill/>
-          <a:ln/>
-        </p:spPr>
-        <p:txBody>
-          <a:bodyPr/>
-          <a:lstStyle/>
-          <a:p>
-            <a:pPr>
-              <a:lnSpc>
-                <a:spcPct val="90000"/>
-              </a:lnSpc>
-            </a:pPr>
-            <a:r>
-              <a:rPr lang="en-US" sz="2800" i="1"/>
-              <a:t>ConcepTest 18.5b</a:t>
-            </a:r>
-            <a:r>
-              <a:rPr lang="en-US" sz="2800" i="1">
-                <a:solidFill>
-                  <a:srgbClr val="000000"/>
-                </a:solidFill>
-                <a:effectLst/>
-              </a:rPr>
-              <a:t>	</a:t>
-            </a:r>
-            <a:r>
-              <a:rPr lang="en-US" sz="2800">
-                <a:solidFill>
-                  <a:schemeClr val="accent2"/>
-                </a:solidFill>
-              </a:rPr>
-              <a:t>Space Heaters I</a:t>
-            </a:r>
-          </a:p>
-        </p:txBody>
-      </p:sp>
-      <p:sp>
-        <p:nvSpPr>
-          <p:cNvPr id="1579012" name="Rectangle 4"/>
-          <p:cNvSpPr>
-            <a:spLocks noGrp="1" noChangeArrowheads="1"/>
-          </p:cNvSpPr>
-          <p:nvPr>
-            <p:ph idx="1"/>
-          </p:nvPr>
-        </p:nvSpPr>
-        <p:spPr>
-          <a:xfrm>
-            <a:off x="279400" y="839788"/>
-            <a:ext cx="4694238" cy="2395537"/>
-          </a:xfrm>
-          <a:noFill/>
-          <a:ln/>
-        </p:spPr>
-        <p:txBody>
-          <a:bodyPr>
-            <a:normAutofit fontScale="77500" lnSpcReduction="20000"/>
-          </a:bodyPr>
-          <a:lstStyle/>
-          <a:p>
-            <a:pPr marL="401638" indent="-401638">
-              <a:lnSpc>
-                <a:spcPct val="130000"/>
-              </a:lnSpc>
-              <a:spcBef>
-                <a:spcPct val="50000"/>
-              </a:spcBef>
-              <a:buFont typeface="Monotype Sorts" pitchFamily="2" charset="2"/>
-              <a:buNone/>
-            </a:pPr>
-            <a:r>
-              <a:rPr lang="en-US" sz="2200" b="1">
-                <a:effectLst>
-                  <a:outerShdw blurRad="38100" dist="38100" dir="2700000" algn="tl">
-                    <a:srgbClr val="000000"/>
-                  </a:outerShdw>
-                </a:effectLst>
-              </a:rPr>
-              <a:t>	</a:t>
-            </a:r>
-            <a:r>
-              <a:rPr lang="en-US" b="1">
-                <a:effectLst>
-                  <a:outerShdw blurRad="38100" dist="38100" dir="2700000" algn="tl">
-                    <a:srgbClr val="000000"/>
-                  </a:outerShdw>
-                </a:effectLst>
-              </a:rPr>
-              <a:t>Two space heaters in your living room are operated at 120 V.  Heater 1 has </a:t>
-            </a:r>
-            <a:r>
-              <a:rPr lang="en-US" b="1">
-                <a:solidFill>
-                  <a:schemeClr val="accent2"/>
-                </a:solidFill>
-                <a:effectLst>
-                  <a:outerShdw blurRad="38100" dist="38100" dir="2700000" algn="tl">
-                    <a:srgbClr val="000000"/>
-                  </a:outerShdw>
-                </a:effectLst>
-              </a:rPr>
-              <a:t>twice</a:t>
-            </a:r>
-            <a:r>
-              <a:rPr lang="en-US" b="1">
-                <a:effectLst>
-                  <a:outerShdw blurRad="38100" dist="38100" dir="2700000" algn="tl">
-                    <a:srgbClr val="000000"/>
-                  </a:outerShdw>
-                </a:effectLst>
-              </a:rPr>
-              <a:t> the resistance of heater 2.  Which one will give off more heat?</a:t>
-            </a:r>
-          </a:p>
-        </p:txBody>
-      </p:sp>
-      <p:sp>
-        <p:nvSpPr>
-          <p:cNvPr id="1579013" name="Rectangle 5"/>
+          <p:cNvPr id="1576962" name="AutoShape 2"/>
           <p:cNvSpPr>
             <a:spLocks noChangeArrowheads="1"/>
           </p:cNvSpPr>
@@ -23505,8 +22822,50 @@
         </p:nvSpPr>
         <p:spPr bwMode="auto">
           <a:xfrm>
-            <a:off x="5240338" y="1104900"/>
-            <a:ext cx="3683000" cy="1492250"/>
+            <a:off x="271463" y="3898900"/>
+            <a:ext cx="5465762" cy="1543050"/>
+          </a:xfrm>
+          <a:prstGeom prst="roundRect">
+            <a:avLst>
+              <a:gd name="adj" fmla="val 16667"/>
+            </a:avLst>
+          </a:prstGeom>
+          <a:solidFill>
+            <a:schemeClr val="accent1"/>
+          </a:solidFill>
+          <a:ln w="38100">
+            <a:solidFill>
+              <a:srgbClr val="000000"/>
+            </a:solidFill>
+            <a:round/>
+            <a:headEnd type="none" w="sm" len="sm"/>
+            <a:tailEnd type="none" w="sm" len="sm"/>
+          </a:ln>
+          <a:effectLst/>
+        </p:spPr>
+        <p:txBody>
+          <a:bodyPr wrap="none" anchor="ctr"/>
+          <a:lstStyle/>
+          <a:p>
+            <a:pPr algn="ctr"/>
+            <a:endParaRPr lang="en-US">
+              <a:latin typeface="Times New Roman" pitchFamily="18" charset="0"/>
+            </a:endParaRPr>
+          </a:p>
+        </p:txBody>
+      </p:sp>
+      <p:sp>
+        <p:nvSpPr>
+          <p:cNvPr id="1576963" name="Rectangle 3"/>
+          <p:cNvSpPr>
+            <a:spLocks noChangeArrowheads="1"/>
+          </p:cNvSpPr>
+          <p:nvPr/>
+        </p:nvSpPr>
+        <p:spPr bwMode="auto">
+          <a:xfrm>
+            <a:off x="192088" y="3956050"/>
+            <a:ext cx="5738812" cy="1282700"/>
           </a:xfrm>
           <a:prstGeom prst="rect">
             <a:avLst/>
@@ -23528,7 +22887,7 @@
           <a:p>
             <a:pPr marL="285750" indent="-285750">
               <a:lnSpc>
-                <a:spcPct val="120000"/>
+                <a:spcPct val="130000"/>
               </a:lnSpc>
               <a:spcBef>
                 <a:spcPct val="50000"/>
@@ -23537,31 +22896,394 @@
             <a:r>
               <a:rPr lang="en-US" sz="2000" b="1">
                 <a:solidFill>
-                  <a:schemeClr val="tx2"/>
-                </a:solidFill>
-              </a:rPr>
-              <a:t>1)</a:t>
-            </a:r>
-            <a:r>
-              <a:rPr lang="en-US" sz="2000" b="1">
-                <a:solidFill>
-                  <a:schemeClr val="tx2"/>
+                  <a:schemeClr val="bg2"/>
+                </a:solidFill>
+              </a:rPr>
+              <a:t>	Since   </a:t>
+            </a:r>
+            <a:r>
+              <a:rPr lang="en-US" sz="2000" b="1" i="1">
+                <a:solidFill>
+                  <a:srgbClr val="990000"/>
                 </a:solidFill>
                 <a:effectLst>
                   <a:outerShdw blurRad="38100" dist="38100" dir="2700000" algn="tl">
                     <a:srgbClr val="000000"/>
                   </a:outerShdw>
                 </a:effectLst>
+                <a:latin typeface="Times New Roman" pitchFamily="18" charset="0"/>
+              </a:rPr>
+              <a:t>P = V</a:t>
+            </a:r>
+            <a:r>
+              <a:rPr lang="en-US" sz="2000" b="1" i="1" baseline="30000">
+                <a:solidFill>
+                  <a:srgbClr val="990000"/>
+                </a:solidFill>
+                <a:effectLst>
+                  <a:outerShdw blurRad="38100" dist="38100" dir="2700000" algn="tl">
+                    <a:srgbClr val="000000"/>
+                  </a:outerShdw>
+                </a:effectLst>
+                <a:latin typeface="Times New Roman" pitchFamily="18" charset="0"/>
+              </a:rPr>
+              <a:t>2</a:t>
+            </a:r>
+            <a:r>
+              <a:rPr lang="en-US" sz="2000" b="1" i="1">
+                <a:solidFill>
+                  <a:srgbClr val="990000"/>
+                </a:solidFill>
+                <a:effectLst>
+                  <a:outerShdw blurRad="38100" dist="38100" dir="2700000" algn="tl">
+                    <a:srgbClr val="000000"/>
+                  </a:outerShdw>
+                </a:effectLst>
+                <a:latin typeface="Times New Roman" pitchFamily="18" charset="0"/>
+              </a:rPr>
+              <a:t> / R</a:t>
+            </a:r>
+            <a:r>
+              <a:rPr lang="en-US" sz="2000" b="1" i="1">
+                <a:effectLst>
+                  <a:outerShdw blurRad="38100" dist="38100" dir="2700000" algn="tl">
+                    <a:srgbClr val="000000"/>
+                  </a:outerShdw>
+                </a:effectLst>
+                <a:latin typeface="Times New Roman" pitchFamily="18" charset="0"/>
               </a:rPr>
               <a:t>   </a:t>
             </a:r>
             <a:r>
               <a:rPr lang="en-US" sz="2000" b="1">
                 <a:solidFill>
+                  <a:schemeClr val="bg2"/>
+                </a:solidFill>
+              </a:rPr>
+              <a:t>the bulb with the </a:t>
+            </a:r>
+            <a:r>
+              <a:rPr lang="en-US" sz="2000" b="1">
+                <a:solidFill>
+                  <a:srgbClr val="0066FF"/>
+                </a:solidFill>
+                <a:effectLst>
+                  <a:outerShdw blurRad="38100" dist="38100" dir="2700000" algn="tl">
+                    <a:srgbClr val="000000"/>
+                  </a:outerShdw>
+                </a:effectLst>
+              </a:rPr>
+              <a:t>lower power rating</a:t>
+            </a:r>
+            <a:r>
+              <a:rPr lang="en-US" sz="2000" b="1">
+                <a:solidFill>
+                  <a:schemeClr val="bg2"/>
+                </a:solidFill>
+              </a:rPr>
+              <a:t> has to have the </a:t>
+            </a:r>
+            <a:r>
+              <a:rPr lang="en-US" sz="2000" b="1">
+                <a:solidFill>
+                  <a:srgbClr val="0066FF"/>
+                </a:solidFill>
+                <a:effectLst>
+                  <a:outerShdw blurRad="38100" dist="38100" dir="2700000" algn="tl">
+                    <a:srgbClr val="000000"/>
+                  </a:outerShdw>
+                </a:effectLst>
+              </a:rPr>
+              <a:t>higher resistance</a:t>
+            </a:r>
+            <a:r>
+              <a:rPr lang="en-US" sz="2000" b="1">
+                <a:solidFill>
+                  <a:schemeClr val="bg2"/>
+                </a:solidFill>
+              </a:rPr>
+              <a:t>.</a:t>
+            </a:r>
+          </a:p>
+        </p:txBody>
+      </p:sp>
+      <p:sp>
+        <p:nvSpPr>
+          <p:cNvPr id="1576965" name="Rectangle 5"/>
+          <p:cNvSpPr>
+            <a:spLocks noGrp="1" noChangeArrowheads="1"/>
+          </p:cNvSpPr>
+          <p:nvPr>
+            <p:ph type="title"/>
+          </p:nvPr>
+        </p:nvSpPr>
+        <p:spPr>
+          <a:xfrm>
+            <a:off x="660400" y="0"/>
+            <a:ext cx="8050213" cy="838200"/>
+          </a:xfrm>
+          <a:noFill/>
+          <a:ln/>
+        </p:spPr>
+        <p:txBody>
+          <a:bodyPr/>
+          <a:lstStyle/>
+          <a:p>
+            <a:pPr>
+              <a:lnSpc>
+                <a:spcPct val="90000"/>
+              </a:lnSpc>
+            </a:pPr>
+            <a:r>
+              <a:rPr lang="en-US" sz="2800" i="1"/>
+              <a:t>ConcepTest 18.5a      </a:t>
+            </a:r>
+            <a:r>
+              <a:rPr lang="en-US" sz="2800">
+                <a:solidFill>
+                  <a:schemeClr val="accent2"/>
+                </a:solidFill>
+              </a:rPr>
+              <a:t>Lightbulbs</a:t>
+            </a:r>
+          </a:p>
+        </p:txBody>
+      </p:sp>
+      <p:sp>
+        <p:nvSpPr>
+          <p:cNvPr id="1576968" name="Rectangle 8"/>
+          <p:cNvSpPr>
+            <a:spLocks noGrp="1" noChangeArrowheads="1"/>
+          </p:cNvSpPr>
+          <p:nvPr>
+            <p:ph idx="1"/>
+          </p:nvPr>
+        </p:nvSpPr>
+        <p:spPr>
+          <a:xfrm>
+            <a:off x="0" y="855663"/>
+            <a:ext cx="5237163" cy="2057400"/>
+          </a:xfrm>
+          <a:noFill/>
+          <a:ln/>
+        </p:spPr>
+        <p:txBody>
+          <a:bodyPr>
+            <a:normAutofit fontScale="70000" lnSpcReduction="20000"/>
+          </a:bodyPr>
+          <a:lstStyle/>
+          <a:p>
+            <a:pPr marL="401638" indent="-401638">
+              <a:lnSpc>
+                <a:spcPct val="140000"/>
+              </a:lnSpc>
+              <a:spcBef>
+                <a:spcPct val="50000"/>
+              </a:spcBef>
+              <a:buFont typeface="Monotype Sorts" pitchFamily="2" charset="2"/>
+              <a:buNone/>
+            </a:pPr>
+            <a:r>
+              <a:rPr lang="en-US" sz="2200" b="1">
+                <a:effectLst>
+                  <a:outerShdw blurRad="38100" dist="38100" dir="2700000" algn="tl">
+                    <a:srgbClr val="000000"/>
+                  </a:outerShdw>
+                </a:effectLst>
+              </a:rPr>
+              <a:t>	</a:t>
+            </a:r>
+            <a:r>
+              <a:rPr lang="en-US" b="1">
+                <a:effectLst>
+                  <a:outerShdw blurRad="38100" dist="38100" dir="2700000" algn="tl">
+                    <a:srgbClr val="000000"/>
+                  </a:outerShdw>
+                </a:effectLst>
+              </a:rPr>
+              <a:t>Two lightbulbs operate at 120 V, but one has a power rating of </a:t>
+            </a:r>
+            <a:r>
+              <a:rPr lang="en-US" b="1">
+                <a:solidFill>
                   <a:schemeClr val="tx2"/>
                 </a:solidFill>
-              </a:rPr>
-              <a:t>heater 1</a:t>
+                <a:effectLst>
+                  <a:outerShdw blurRad="38100" dist="38100" dir="2700000" algn="tl">
+                    <a:srgbClr val="000000"/>
+                  </a:outerShdw>
+                </a:effectLst>
+              </a:rPr>
+              <a:t>25 W</a:t>
+            </a:r>
+            <a:r>
+              <a:rPr lang="en-US" b="1">
+                <a:effectLst>
+                  <a:outerShdw blurRad="38100" dist="38100" dir="2700000" algn="tl">
+                    <a:srgbClr val="000000"/>
+                  </a:outerShdw>
+                </a:effectLst>
+              </a:rPr>
+              <a:t> while the other has a power rating of </a:t>
+            </a:r>
+            <a:r>
+              <a:rPr lang="en-US" b="1">
+                <a:solidFill>
+                  <a:schemeClr val="tx2"/>
+                </a:solidFill>
+                <a:effectLst>
+                  <a:outerShdw blurRad="38100" dist="38100" dir="2700000" algn="tl">
+                    <a:srgbClr val="000000"/>
+                  </a:outerShdw>
+                </a:effectLst>
+              </a:rPr>
+              <a:t>100 W</a:t>
+            </a:r>
+            <a:r>
+              <a:rPr lang="en-US" b="1">
+                <a:effectLst>
+                  <a:outerShdw blurRad="38100" dist="38100" dir="2700000" algn="tl">
+                    <a:srgbClr val="000000"/>
+                  </a:outerShdw>
+                </a:effectLst>
+              </a:rPr>
+              <a:t>.  Which one has the greater resistance? </a:t>
+            </a:r>
+          </a:p>
+        </p:txBody>
+      </p:sp>
+      <p:sp>
+        <p:nvSpPr>
+          <p:cNvPr id="1576966" name="Oval 6"/>
+          <p:cNvSpPr>
+            <a:spLocks noChangeArrowheads="1"/>
+          </p:cNvSpPr>
+          <p:nvPr/>
+        </p:nvSpPr>
+        <p:spPr bwMode="auto">
+          <a:xfrm>
+            <a:off x="5416550" y="795338"/>
+            <a:ext cx="3167063" cy="571500"/>
+          </a:xfrm>
+          <a:prstGeom prst="ellipse">
+            <a:avLst/>
+          </a:prstGeom>
+          <a:noFill/>
+          <a:ln w="38100">
+            <a:solidFill>
+              <a:schemeClr val="accent1"/>
+            </a:solidFill>
+            <a:round/>
+            <a:headEnd/>
+            <a:tailEnd/>
+          </a:ln>
+          <a:effectLst/>
+        </p:spPr>
+        <p:txBody>
+          <a:bodyPr anchor="ctr">
+            <a:spAutoFit/>
+          </a:bodyPr>
+          <a:lstStyle/>
+          <a:p>
+            <a:endParaRPr lang="en-US"/>
+          </a:p>
+        </p:txBody>
+      </p:sp>
+      <p:pic>
+        <p:nvPicPr>
+          <p:cNvPr id="1576967" name="Picture 7" descr="FG18_015"/>
+          <p:cNvPicPr>
+            <a:picLocks noChangeAspect="1" noChangeArrowheads="1"/>
+          </p:cNvPicPr>
+          <p:nvPr/>
+        </p:nvPicPr>
+        <p:blipFill>
+          <a:blip r:embed="rId3" cstate="print">
+            <a:lum bright="-30000" contrast="48000"/>
+          </a:blip>
+          <a:srcRect l="26016" t="20274" r="29951" b="9998"/>
+          <a:stretch>
+            <a:fillRect/>
+          </a:stretch>
+        </p:blipFill>
+        <p:spPr bwMode="auto">
+          <a:xfrm>
+            <a:off x="6403975" y="3362325"/>
+            <a:ext cx="2740025" cy="2892425"/>
+          </a:xfrm>
+          <a:prstGeom prst="rect">
+            <a:avLst/>
+          </a:prstGeom>
+          <a:noFill/>
+        </p:spPr>
+      </p:pic>
+      <p:sp>
+        <p:nvSpPr>
+          <p:cNvPr id="1576969" name="Rectangle 9"/>
+          <p:cNvSpPr>
+            <a:spLocks noChangeArrowheads="1"/>
+          </p:cNvSpPr>
+          <p:nvPr/>
+        </p:nvSpPr>
+        <p:spPr bwMode="auto">
+          <a:xfrm>
+            <a:off x="5521325" y="842963"/>
+            <a:ext cx="3622675" cy="2224087"/>
+          </a:xfrm>
+          <a:prstGeom prst="rect">
+            <a:avLst/>
+          </a:prstGeom>
+          <a:noFill/>
+          <a:ln w="9525">
+            <a:noFill/>
+            <a:miter lim="800000"/>
+            <a:headEnd/>
+            <a:tailEnd/>
+          </a:ln>
+          <a:effectLst/>
+        </p:spPr>
+        <p:txBody>
+          <a:bodyPr lIns="92075" tIns="46038" rIns="92075" bIns="46038">
+            <a:spAutoFit/>
+          </a:bodyPr>
+          <a:lstStyle/>
+          <a:p>
+            <a:pPr marL="285750" indent="-285750">
+              <a:lnSpc>
+                <a:spcPct val="110000"/>
+              </a:lnSpc>
+              <a:spcBef>
+                <a:spcPct val="50000"/>
+              </a:spcBef>
+            </a:pPr>
+            <a:r>
+              <a:rPr lang="en-US" sz="2000" b="1">
+                <a:solidFill>
+                  <a:schemeClr val="tx2"/>
+                </a:solidFill>
+              </a:rPr>
+              <a:t>1)</a:t>
+            </a:r>
+            <a:r>
+              <a:rPr lang="en-US" sz="2000" b="1">
+                <a:solidFill>
+                  <a:schemeClr val="tx2"/>
+                </a:solidFill>
+                <a:effectLst>
+                  <a:outerShdw blurRad="38100" dist="38100" dir="2700000" algn="tl">
+                    <a:srgbClr val="000000"/>
+                  </a:outerShdw>
+                </a:effectLst>
+              </a:rPr>
+              <a:t>   </a:t>
+            </a:r>
+            <a:r>
+              <a:rPr lang="en-US" sz="2000" b="1">
+                <a:solidFill>
+                  <a:schemeClr val="tx2"/>
+                </a:solidFill>
+              </a:rPr>
+              <a:t>the 25 W bulb</a:t>
             </a:r>
             <a:endParaRPr lang="en-US" sz="2000" b="1">
               <a:solidFill>
@@ -23577,7 +23299,7 @@
           <a:p>
             <a:pPr marL="285750" indent="-285750">
               <a:lnSpc>
-                <a:spcPct val="120000"/>
+                <a:spcPct val="110000"/>
               </a:lnSpc>
               <a:spcBef>
                 <a:spcPct val="50000"/>
@@ -23610,7 +23332,7 @@
                   <a:schemeClr val="tx2"/>
                 </a:solidFill>
               </a:rPr>
-              <a:t>heater 2</a:t>
+              <a:t>the 100 W bulb</a:t>
             </a:r>
             <a:endParaRPr lang="en-US" sz="2000" b="1">
               <a:solidFill>
@@ -23626,7 +23348,7 @@
           <a:p>
             <a:pPr marL="285750" indent="-285750">
               <a:lnSpc>
-                <a:spcPct val="120000"/>
+                <a:spcPct val="110000"/>
               </a:lnSpc>
               <a:spcBef>
                 <a:spcPct val="50000"/>
@@ -23659,7 +23381,88 @@
                   <a:schemeClr val="tx2"/>
                 </a:solidFill>
               </a:rPr>
-              <a:t>both equally</a:t>
+              <a:t>both have the same</a:t>
+            </a:r>
+          </a:p>
+          <a:p>
+            <a:pPr marL="285750" indent="-285750">
+              <a:lnSpc>
+                <a:spcPct val="110000"/>
+              </a:lnSpc>
+              <a:spcBef>
+                <a:spcPct val="50000"/>
+              </a:spcBef>
+            </a:pPr>
+            <a:r>
+              <a:rPr lang="en-US" sz="2000" b="1">
+                <a:solidFill>
+                  <a:schemeClr val="tx2"/>
+                </a:solidFill>
+              </a:rPr>
+              <a:t>4)   this has nothing to do with resistance</a:t>
+            </a:r>
+            <a:endParaRPr lang="en-US" sz="2000" b="1"/>
+          </a:p>
+        </p:txBody>
+      </p:sp>
+      <p:sp>
+        <p:nvSpPr>
+          <p:cNvPr id="1576970" name="Text Box 10"/>
+          <p:cNvSpPr txBox="1">
+            <a:spLocks noChangeArrowheads="1"/>
+          </p:cNvSpPr>
+          <p:nvPr/>
+        </p:nvSpPr>
+        <p:spPr bwMode="auto">
+          <a:xfrm>
+            <a:off x="0" y="6161088"/>
+            <a:ext cx="6378575" cy="406400"/>
+          </a:xfrm>
+          <a:prstGeom prst="rect">
+            <a:avLst/>
+          </a:prstGeom>
+          <a:solidFill>
+            <a:srgbClr val="3366FF"/>
+          </a:solidFill>
+          <a:ln w="9525">
+            <a:solidFill>
+              <a:schemeClr val="tx2"/>
+            </a:solidFill>
+            <a:miter lim="800000"/>
+            <a:headEnd type="none" w="sm" len="sm"/>
+            <a:tailEnd type="none" w="sm" len="sm"/>
+          </a:ln>
+          <a:effectLst/>
+        </p:spPr>
+        <p:txBody>
+          <a:bodyPr>
+            <a:spAutoFit/>
+          </a:bodyPr>
+          <a:lstStyle/>
+          <a:p>
+            <a:pPr algn="ctr"/>
+            <a:r>
+              <a:rPr lang="en-US" sz="2000" b="1">
+                <a:solidFill>
+                  <a:srgbClr val="000000"/>
+                </a:solidFill>
+                <a:effectLst>
+                  <a:outerShdw blurRad="38100" dist="38100" dir="2700000" algn="tl">
+                    <a:srgbClr val="FFFFFF"/>
+                  </a:outerShdw>
+                </a:effectLst>
+              </a:rPr>
+              <a:t>Follow-up:</a:t>
+            </a:r>
+            <a:r>
+              <a:rPr lang="en-US" sz="2000" b="1">
+                <a:effectLst>
+                  <a:outerShdw blurRad="38100" dist="38100" dir="2700000" algn="tl">
+                    <a:srgbClr val="000000"/>
+                  </a:outerShdw>
+                </a:effectLst>
+              </a:rPr>
+              <a:t>  Which one carries the greater current?</a:t>
             </a:r>
           </a:p>
         </p:txBody>
@@ -23673,6 +23476,331 @@
 </file>
 
 <file path=ppt/slides/slide37.xml><?xml version="1.0" encoding="utf-8"?>
+<p:sld xmlns:a="http://schemas.openxmlformats.org/drawingml/2006/main" xmlns:r="http://schemas.openxmlformats.org/officeDocument/2006/relationships" xmlns:p="http://schemas.openxmlformats.org/presentationml/2006/main">
+  <p:cSld>
+    <p:spTree>
+      <p:nvGrpSpPr>
+        <p:cNvPr id="1" name=""/>
+        <p:cNvGrpSpPr/>
+        <p:nvPr/>
+      </p:nvGrpSpPr>
+      <p:grpSpPr>
+        <a:xfrm>
+          <a:off x="0" y="0"/>
+          <a:ext cx="0" cy="0"/>
+          <a:chOff x="0" y="0"/>
+          <a:chExt cx="0" cy="0"/>
+        </a:xfrm>
+      </p:grpSpPr>
+      <p:sp>
+        <p:nvSpPr>
+          <p:cNvPr id="1579011" name="Rectangle 3"/>
+          <p:cNvSpPr>
+            <a:spLocks noGrp="1" noChangeArrowheads="1"/>
+          </p:cNvSpPr>
+          <p:nvPr>
+            <p:ph type="title"/>
+          </p:nvPr>
+        </p:nvSpPr>
+        <p:spPr>
+          <a:xfrm>
+            <a:off x="660400" y="0"/>
+            <a:ext cx="8050213" cy="838200"/>
+          </a:xfrm>
+          <a:noFill/>
+          <a:ln/>
+        </p:spPr>
+        <p:txBody>
+          <a:bodyPr/>
+          <a:lstStyle/>
+          <a:p>
+            <a:pPr>
+              <a:lnSpc>
+                <a:spcPct val="90000"/>
+              </a:lnSpc>
+            </a:pPr>
+            <a:r>
+              <a:rPr lang="en-US" sz="2800" i="1"/>
+              <a:t>ConcepTest 18.5b</a:t>
+            </a:r>
+            <a:r>
+              <a:rPr lang="en-US" sz="2800" i="1">
+                <a:solidFill>
+                  <a:srgbClr val="000000"/>
+                </a:solidFill>
+                <a:effectLst/>
+              </a:rPr>
+              <a:t>	</a:t>
+            </a:r>
+            <a:r>
+              <a:rPr lang="en-US" sz="2800">
+                <a:solidFill>
+                  <a:schemeClr val="accent2"/>
+                </a:solidFill>
+              </a:rPr>
+              <a:t>Space Heaters I</a:t>
+            </a:r>
+          </a:p>
+        </p:txBody>
+      </p:sp>
+      <p:sp>
+        <p:nvSpPr>
+          <p:cNvPr id="1579012" name="Rectangle 4"/>
+          <p:cNvSpPr>
+            <a:spLocks noGrp="1" noChangeArrowheads="1"/>
+          </p:cNvSpPr>
+          <p:nvPr>
+            <p:ph idx="1"/>
+          </p:nvPr>
+        </p:nvSpPr>
+        <p:spPr>
+          <a:xfrm>
+            <a:off x="279400" y="839788"/>
+            <a:ext cx="4694238" cy="2395537"/>
+          </a:xfrm>
+          <a:noFill/>
+          <a:ln/>
+        </p:spPr>
+        <p:txBody>
+          <a:bodyPr>
+            <a:normAutofit fontScale="77500" lnSpcReduction="20000"/>
+          </a:bodyPr>
+          <a:lstStyle/>
+          <a:p>
+            <a:pPr marL="401638" indent="-401638">
+              <a:lnSpc>
+                <a:spcPct val="130000"/>
+              </a:lnSpc>
+              <a:spcBef>
+                <a:spcPct val="50000"/>
+              </a:spcBef>
+              <a:buFont typeface="Monotype Sorts" pitchFamily="2" charset="2"/>
+              <a:buNone/>
+            </a:pPr>
+            <a:r>
+              <a:rPr lang="en-US" sz="2200" b="1">
+                <a:effectLst>
+                  <a:outerShdw blurRad="38100" dist="38100" dir="2700000" algn="tl">
+                    <a:srgbClr val="000000"/>
+                  </a:outerShdw>
+                </a:effectLst>
+              </a:rPr>
+              <a:t>	</a:t>
+            </a:r>
+            <a:r>
+              <a:rPr lang="en-US" b="1">
+                <a:effectLst>
+                  <a:outerShdw blurRad="38100" dist="38100" dir="2700000" algn="tl">
+                    <a:srgbClr val="000000"/>
+                  </a:outerShdw>
+                </a:effectLst>
+              </a:rPr>
+              <a:t>Two space heaters in your living room are operated at 120 V.  Heater 1 has </a:t>
+            </a:r>
+            <a:r>
+              <a:rPr lang="en-US" b="1">
+                <a:solidFill>
+                  <a:schemeClr val="accent2"/>
+                </a:solidFill>
+                <a:effectLst>
+                  <a:outerShdw blurRad="38100" dist="38100" dir="2700000" algn="tl">
+                    <a:srgbClr val="000000"/>
+                  </a:outerShdw>
+                </a:effectLst>
+              </a:rPr>
+              <a:t>twice</a:t>
+            </a:r>
+            <a:r>
+              <a:rPr lang="en-US" b="1">
+                <a:effectLst>
+                  <a:outerShdw blurRad="38100" dist="38100" dir="2700000" algn="tl">
+                    <a:srgbClr val="000000"/>
+                  </a:outerShdw>
+                </a:effectLst>
+              </a:rPr>
+              <a:t> the resistance of heater 2.  Which one will give off more heat?</a:t>
+            </a:r>
+          </a:p>
+        </p:txBody>
+      </p:sp>
+      <p:sp>
+        <p:nvSpPr>
+          <p:cNvPr id="1579013" name="Rectangle 5"/>
+          <p:cNvSpPr>
+            <a:spLocks noChangeArrowheads="1"/>
+          </p:cNvSpPr>
+          <p:nvPr/>
+        </p:nvSpPr>
+        <p:spPr bwMode="auto">
+          <a:xfrm>
+            <a:off x="5240338" y="1104900"/>
+            <a:ext cx="3683000" cy="1492250"/>
+          </a:xfrm>
+          <a:prstGeom prst="rect">
+            <a:avLst/>
+          </a:prstGeom>
+          <a:noFill/>
+          <a:ln w="9525">
+            <a:noFill/>
+            <a:miter lim="800000"/>
+            <a:headEnd/>
+            <a:tailEnd/>
+          </a:ln>
+          <a:effectLst/>
+        </p:spPr>
+        <p:txBody>
+          <a:bodyPr lIns="92075" tIns="46038" rIns="92075" bIns="46038">
+            <a:spAutoFit/>
+          </a:bodyPr>
+          <a:lstStyle/>
+          <a:p>
+            <a:pPr marL="285750" indent="-285750">
+              <a:lnSpc>
+                <a:spcPct val="120000"/>
+              </a:lnSpc>
+              <a:spcBef>
+                <a:spcPct val="50000"/>
+              </a:spcBef>
+            </a:pPr>
+            <a:r>
+              <a:rPr lang="en-US" sz="2000" b="1">
+                <a:solidFill>
+                  <a:schemeClr val="tx2"/>
+                </a:solidFill>
+              </a:rPr>
+              <a:t>1)</a:t>
+            </a:r>
+            <a:r>
+              <a:rPr lang="en-US" sz="2000" b="1">
+                <a:solidFill>
+                  <a:schemeClr val="tx2"/>
+                </a:solidFill>
+                <a:effectLst>
+                  <a:outerShdw blurRad="38100" dist="38100" dir="2700000" algn="tl">
+                    <a:srgbClr val="000000"/>
+                  </a:outerShdw>
+                </a:effectLst>
+              </a:rPr>
+              <a:t>   </a:t>
+            </a:r>
+            <a:r>
+              <a:rPr lang="en-US" sz="2000" b="1">
+                <a:solidFill>
+                  <a:schemeClr val="tx2"/>
+                </a:solidFill>
+              </a:rPr>
+              <a:t>heater 1</a:t>
+            </a:r>
+            <a:endParaRPr lang="en-US" sz="2000" b="1">
+              <a:solidFill>
+                <a:schemeClr val="tx2"/>
+              </a:solidFill>
+              <a:effectLst>
+                <a:outerShdw blurRad="38100" dist="38100" dir="2700000" algn="tl">
+                  <a:srgbClr val="000000"/>
+                </a:outerShdw>
+              </a:effectLst>
+            </a:endParaRPr>
+          </a:p>
+          <a:p>
+            <a:pPr marL="285750" indent="-285750">
+              <a:lnSpc>
+                <a:spcPct val="120000"/>
+              </a:lnSpc>
+              <a:spcBef>
+                <a:spcPct val="50000"/>
+              </a:spcBef>
+            </a:pPr>
+            <a:r>
+              <a:rPr lang="en-US" sz="2000" b="1">
+                <a:solidFill>
+                  <a:schemeClr val="tx2"/>
+                </a:solidFill>
+              </a:rPr>
+              <a:t>2)</a:t>
+            </a:r>
+            <a:r>
+              <a:rPr lang="en-US" sz="2000" b="1">
+                <a:solidFill>
+                  <a:schemeClr val="tx2"/>
+                </a:solidFill>
+                <a:effectLst>
+                  <a:outerShdw blurRad="38100" dist="38100" dir="2700000" algn="tl">
+                    <a:srgbClr val="000000"/>
+                  </a:outerShdw>
+                </a:effectLst>
+              </a:rPr>
+              <a:t>   </a:t>
+            </a:r>
+            <a:r>
+              <a:rPr lang="en-US" sz="2000" b="1">
+                <a:solidFill>
+                  <a:schemeClr val="tx2"/>
+                </a:solidFill>
+              </a:rPr>
+              <a:t>heater 2</a:t>
+            </a:r>
+            <a:endParaRPr lang="en-US" sz="2000" b="1">
+              <a:solidFill>
+                <a:schemeClr val="tx2"/>
+              </a:solidFill>
+              <a:effectLst>
+                <a:outerShdw blurRad="38100" dist="38100" dir="2700000" algn="tl">
+                  <a:srgbClr val="000000"/>
+                </a:outerShdw>
+              </a:effectLst>
+            </a:endParaRPr>
+          </a:p>
+          <a:p>
+            <a:pPr marL="285750" indent="-285750">
+              <a:lnSpc>
+                <a:spcPct val="120000"/>
+              </a:lnSpc>
+              <a:spcBef>
+                <a:spcPct val="50000"/>
+              </a:spcBef>
+            </a:pPr>
+            <a:r>
+              <a:rPr lang="en-US" sz="2000" b="1">
+                <a:solidFill>
+                  <a:schemeClr val="tx2"/>
+                </a:solidFill>
+              </a:rPr>
+              <a:t>3)</a:t>
+            </a:r>
+            <a:r>
+              <a:rPr lang="en-US" sz="2000" b="1">
+                <a:solidFill>
+                  <a:schemeClr val="tx2"/>
+                </a:solidFill>
+                <a:effectLst>
+                  <a:outerShdw blurRad="38100" dist="38100" dir="2700000" algn="tl">
+                    <a:srgbClr val="000000"/>
+                  </a:outerShdw>
+                </a:effectLst>
+              </a:rPr>
+              <a:t>   </a:t>
+            </a:r>
+            <a:r>
+              <a:rPr lang="en-US" sz="2000" b="1">
+                <a:solidFill>
+                  <a:schemeClr val="tx2"/>
+                </a:solidFill>
+              </a:rPr>
+              <a:t>both equally</a:t>
+            </a:r>
+          </a:p>
+        </p:txBody>
+      </p:sp>
+    </p:spTree>
+  </p:cSld>
+  <p:clrMapOvr>
+    <a:masterClrMapping/>
+  </p:clrMapOvr>
+</p:sld>
+</file>
+
+<file path=ppt/slides/slide38.xml><?xml version="1.0" encoding="utf-8"?>
 <p:sld xmlns:a="http://schemas.openxmlformats.org/drawingml/2006/main" xmlns:r="http://schemas.openxmlformats.org/officeDocument/2006/relationships" xmlns:p="http://schemas.openxmlformats.org/presentationml/2006/main">
   <p:cSld>
     <p:spTree>

</xml_diff>